<commit_message>
Added 8-4 code, working on 256 bits support
</commit_message>
<xml_diff>
--- a/presentation.pptx
+++ b/presentation.pptx
@@ -5,7 +5,7 @@
     <p:sldMasterId id="2147483702" r:id="rId1"/>
   </p:sldMasterIdLst>
   <p:notesMasterIdLst>
-    <p:notesMasterId r:id="rId13"/>
+    <p:notesMasterId r:id="rId17"/>
   </p:notesMasterIdLst>
   <p:sldIdLst>
     <p:sldId id="256" r:id="rId2"/>
@@ -13,12 +13,16 @@
     <p:sldId id="258" r:id="rId4"/>
     <p:sldId id="259" r:id="rId5"/>
     <p:sldId id="261" r:id="rId6"/>
-    <p:sldId id="260" r:id="rId7"/>
-    <p:sldId id="266" r:id="rId8"/>
-    <p:sldId id="262" r:id="rId9"/>
-    <p:sldId id="263" r:id="rId10"/>
-    <p:sldId id="264" r:id="rId11"/>
-    <p:sldId id="265" r:id="rId12"/>
+    <p:sldId id="268" r:id="rId7"/>
+    <p:sldId id="267" r:id="rId8"/>
+    <p:sldId id="260" r:id="rId9"/>
+    <p:sldId id="266" r:id="rId10"/>
+    <p:sldId id="271" r:id="rId11"/>
+    <p:sldId id="262" r:id="rId12"/>
+    <p:sldId id="263" r:id="rId13"/>
+    <p:sldId id="264" r:id="rId14"/>
+    <p:sldId id="265" r:id="rId15"/>
+    <p:sldId id="269" r:id="rId16"/>
   </p:sldIdLst>
   <p:sldSz cx="12192000" cy="6858000"/>
   <p:notesSz cx="6858000" cy="9144000"/>
@@ -207,7 +211,7 @@
           <a:p>
             <a:fld id="{6BB0E980-7ABA-4481-9EF3-817879D96B54}" type="datetimeFigureOut">
               <a:rPr lang="fr-CH" smtClean="0"/>
-              <a:t>03.05.2022</a:t>
+              <a:t>06.05.2022</a:t>
             </a:fld>
             <a:endParaRPr lang="fr-CH"/>
           </a:p>
@@ -624,7 +628,7 @@
           <a:p>
             <a:fld id="{B953288E-ECB1-4CB6-9149-4DD58A0B9E16}" type="datetime1">
               <a:rPr lang="fr-CH" smtClean="0"/>
-              <a:t>03.05.2022</a:t>
+              <a:t>06.05.2022</a:t>
             </a:fld>
             <a:endParaRPr lang="fr-CH"/>
           </a:p>
@@ -824,7 +828,7 @@
           <a:p>
             <a:fld id="{E7B4B5DB-3F3D-4665-99FD-6BF2C4DEB5A2}" type="datetime1">
               <a:rPr lang="fr-CH" smtClean="0"/>
-              <a:t>03.05.2022</a:t>
+              <a:t>06.05.2022</a:t>
             </a:fld>
             <a:endParaRPr lang="fr-CH"/>
           </a:p>
@@ -1034,7 +1038,7 @@
           <a:p>
             <a:fld id="{602D9C2A-006D-43DB-9414-F0A25F62BF1D}" type="datetime1">
               <a:rPr lang="fr-CH" smtClean="0"/>
-              <a:t>03.05.2022</a:t>
+              <a:t>06.05.2022</a:t>
             </a:fld>
             <a:endParaRPr lang="fr-CH"/>
           </a:p>
@@ -1234,7 +1238,7 @@
           <a:p>
             <a:fld id="{D575AF35-2CEB-45E2-9DE9-A54F7EF8A4E1}" type="datetime1">
               <a:rPr lang="fr-CH" smtClean="0"/>
-              <a:t>03.05.2022</a:t>
+              <a:t>06.05.2022</a:t>
             </a:fld>
             <a:endParaRPr lang="fr-CH"/>
           </a:p>
@@ -1510,7 +1514,7 @@
           <a:p>
             <a:fld id="{B56ECEDC-3055-4649-9EE7-105C98895AE1}" type="datetime1">
               <a:rPr lang="fr-CH" smtClean="0"/>
-              <a:t>03.05.2022</a:t>
+              <a:t>06.05.2022</a:t>
             </a:fld>
             <a:endParaRPr lang="fr-CH"/>
           </a:p>
@@ -1778,7 +1782,7 @@
           <a:p>
             <a:fld id="{74419353-1D0A-452E-9791-33E743E190C8}" type="datetime1">
               <a:rPr lang="fr-CH" smtClean="0"/>
-              <a:t>03.05.2022</a:t>
+              <a:t>06.05.2022</a:t>
             </a:fld>
             <a:endParaRPr lang="fr-CH"/>
           </a:p>
@@ -2193,7 +2197,7 @@
           <a:p>
             <a:fld id="{1543F95B-83A7-4B0F-908E-FE0C31D62E1B}" type="datetime1">
               <a:rPr lang="fr-CH" smtClean="0"/>
-              <a:t>03.05.2022</a:t>
+              <a:t>06.05.2022</a:t>
             </a:fld>
             <a:endParaRPr lang="fr-CH"/>
           </a:p>
@@ -2335,7 +2339,7 @@
           <a:p>
             <a:fld id="{D3857C53-045E-4F7A-B176-C79F625F6D51}" type="datetime1">
               <a:rPr lang="fr-CH" smtClean="0"/>
-              <a:t>03.05.2022</a:t>
+              <a:t>06.05.2022</a:t>
             </a:fld>
             <a:endParaRPr lang="fr-CH"/>
           </a:p>
@@ -2448,7 +2452,7 @@
           <a:p>
             <a:fld id="{184219F6-B31E-454F-A526-A35AF4EF743C}" type="datetime1">
               <a:rPr lang="fr-CH" smtClean="0"/>
-              <a:t>03.05.2022</a:t>
+              <a:t>06.05.2022</a:t>
             </a:fld>
             <a:endParaRPr lang="fr-CH"/>
           </a:p>
@@ -2761,7 +2765,7 @@
           <a:p>
             <a:fld id="{9ED7A48E-F322-407A-84E2-FFC36A0E166D}" type="datetime1">
               <a:rPr lang="fr-CH" smtClean="0"/>
-              <a:t>03.05.2022</a:t>
+              <a:t>06.05.2022</a:t>
             </a:fld>
             <a:endParaRPr lang="fr-CH"/>
           </a:p>
@@ -3050,7 +3054,7 @@
           <a:p>
             <a:fld id="{21CDD75E-AC35-4034-B4AF-0E67482FF781}" type="datetime1">
               <a:rPr lang="fr-CH" smtClean="0"/>
-              <a:t>03.05.2022</a:t>
+              <a:t>06.05.2022</a:t>
             </a:fld>
             <a:endParaRPr lang="fr-CH"/>
           </a:p>
@@ -3293,7 +3297,7 @@
           <a:p>
             <a:fld id="{1E8DC9A1-8BDD-4A13-A115-80566E471C19}" type="datetime1">
               <a:rPr lang="fr-CH" smtClean="0"/>
-              <a:t>03.05.2022</a:t>
+              <a:t>06.05.2022</a:t>
             </a:fld>
             <a:endParaRPr lang="fr-CH"/>
           </a:p>
@@ -3818,7 +3822,7 @@
           <a:p>
             <a:fld id="{E74FA962-8D07-4007-9D8D-3643C55DBB13}" type="datetime1">
               <a:rPr lang="fr-CH" smtClean="0"/>
-              <a:t>03.05.2022</a:t>
+              <a:t>06.05.2022</a:t>
             </a:fld>
             <a:endParaRPr lang="fr-CH"/>
           </a:p>
@@ -3888,7 +3892,7 @@
           <p:cNvPr id="2" name="Title 1">
             <a:extLst>
               <a:ext uri="{FF2B5EF4-FFF2-40B4-BE49-F238E27FC236}">
-                <a16:creationId xmlns:a16="http://schemas.microsoft.com/office/drawing/2014/main" id="{5E41EE68-C07C-9633-A415-220F89C53BB9}"/>
+                <a16:creationId xmlns:a16="http://schemas.microsoft.com/office/drawing/2014/main" id="{A3892DD0-FBE6-AFB1-D487-FFFD362A329D}"/>
               </a:ext>
             </a:extLst>
           </p:cNvPr>
@@ -3906,15 +3910,7 @@
           <a:p>
             <a:r>
               <a:rPr lang="fr-CH" dirty="0"/>
-              <a:t>Our </a:t>
-            </a:r>
-            <a:r>
-              <a:rPr lang="fr-CH" dirty="0" err="1"/>
-              <a:t>scheme</a:t>
-            </a:r>
-            <a:r>
-              <a:rPr lang="fr-CH" dirty="0"/>
-              <a:t> – Fourier </a:t>
+              <a:t>Fourier </a:t>
             </a:r>
             <a:r>
               <a:rPr lang="fr-CH" dirty="0" err="1"/>
@@ -3922,7 +3918,7 @@
             </a:r>
             <a:r>
               <a:rPr lang="fr-CH" dirty="0"/>
-              <a:t> 3</a:t>
+              <a:t> - 0</a:t>
             </a:r>
           </a:p>
         </p:txBody>
@@ -3932,7 +3928,7 @@
           <p:cNvPr id="3" name="Content Placeholder 2">
             <a:extLst>
               <a:ext uri="{FF2B5EF4-FFF2-40B4-BE49-F238E27FC236}">
-                <a16:creationId xmlns:a16="http://schemas.microsoft.com/office/drawing/2014/main" id="{91E0B8C4-879E-C836-E2D7-2BE1D742DC05}"/>
+                <a16:creationId xmlns:a16="http://schemas.microsoft.com/office/drawing/2014/main" id="{5A76FC41-66BA-7116-EDD6-B6012B5C0D43}"/>
               </a:ext>
             </a:extLst>
           </p:cNvPr>
@@ -3949,90 +3945,26 @@
           <a:lstStyle/>
           <a:p>
             <a:r>
-              <a:rPr lang="fr-CH" dirty="0" err="1"/>
-              <a:t>Finally</a:t>
-            </a:r>
-            <a:r>
-              <a:rPr lang="fr-CH" dirty="0"/>
-              <a:t>, </a:t>
-            </a:r>
-            <a:r>
-              <a:rPr lang="fr-CH" dirty="0" err="1"/>
-              <a:t>we</a:t>
-            </a:r>
-            <a:r>
-              <a:rPr lang="fr-CH" dirty="0"/>
-              <a:t> </a:t>
-            </a:r>
-            <a:r>
-              <a:rPr lang="fr-CH" dirty="0" err="1"/>
-              <a:t>add</a:t>
-            </a:r>
-            <a:r>
-              <a:rPr lang="fr-CH" dirty="0"/>
-              <a:t> </a:t>
-            </a:r>
-            <a:r>
-              <a:rPr lang="fr-CH" dirty="0" err="1"/>
-              <a:t>symmetry</a:t>
-            </a:r>
-            <a:r>
-              <a:rPr lang="fr-CH" dirty="0"/>
-              <a:t>, to help </a:t>
-            </a:r>
-            <a:r>
-              <a:rPr lang="fr-CH" dirty="0" err="1"/>
-              <a:t>recognizability</a:t>
-            </a:r>
-            <a:r>
-              <a:rPr lang="fr-CH" dirty="0"/>
-              <a:t>.</a:t>
-            </a:r>
-          </a:p>
-          <a:p>
-            <a:r>
-              <a:rPr lang="fr-CH" dirty="0"/>
-              <a:t>The </a:t>
-            </a:r>
-            <a:r>
-              <a:rPr lang="fr-CH" dirty="0" err="1"/>
-              <a:t>symmetry</a:t>
-            </a:r>
-            <a:r>
-              <a:rPr lang="fr-CH" dirty="0"/>
-              <a:t> mode (</a:t>
-            </a:r>
-            <a:r>
-              <a:rPr lang="fr-CH" dirty="0" err="1"/>
-              <a:t>e.g</a:t>
-            </a:r>
-            <a:r>
-              <a:rPr lang="fr-CH" dirty="0"/>
-              <a:t> vertical, horizontal, diagonal,…) </a:t>
-            </a:r>
-            <a:r>
-              <a:rPr lang="fr-CH" dirty="0" err="1"/>
-              <a:t>is</a:t>
-            </a:r>
-            <a:r>
-              <a:rPr lang="fr-CH" dirty="0"/>
-              <a:t> </a:t>
-            </a:r>
-            <a:r>
-              <a:rPr lang="fr-CH" dirty="0" err="1"/>
-              <a:t>extracted</a:t>
-            </a:r>
-            <a:r>
-              <a:rPr lang="fr-CH" dirty="0"/>
-              <a:t> </a:t>
-            </a:r>
-            <a:r>
-              <a:rPr lang="fr-CH" dirty="0" err="1"/>
-              <a:t>from</a:t>
-            </a:r>
-            <a:r>
-              <a:rPr lang="fr-CH" dirty="0"/>
-              <a:t> the hash</a:t>
+              <a:rPr lang="fr-CH" dirty="0"/>
+              <a:t>Mapping bits to fréquences</a:t>
+            </a:r>
+          </a:p>
+          <a:p>
+            <a:r>
+              <a:rPr lang="fr-CH" dirty="0" err="1"/>
+              <a:t>Same</a:t>
+            </a:r>
+            <a:r>
+              <a:rPr lang="fr-CH" dirty="0"/>
+              <a:t> importance for </a:t>
+            </a:r>
+            <a:r>
+              <a:rPr lang="fr-CH" dirty="0" err="1"/>
+              <a:t>every</a:t>
+            </a:r>
+            <a:r>
+              <a:rPr lang="fr-CH" dirty="0"/>
+              <a:t> bit </a:t>
             </a:r>
           </a:p>
         </p:txBody>
@@ -4042,7 +3974,7 @@
           <p:cNvPr id="4" name="Date Placeholder 3">
             <a:extLst>
               <a:ext uri="{FF2B5EF4-FFF2-40B4-BE49-F238E27FC236}">
-                <a16:creationId xmlns:a16="http://schemas.microsoft.com/office/drawing/2014/main" id="{94F7E2EB-8682-430B-5F5B-86AC9CA5325F}"/>
+                <a16:creationId xmlns:a16="http://schemas.microsoft.com/office/drawing/2014/main" id="{5F2FC9B0-040D-03D8-3E10-3360D7D73954}"/>
               </a:ext>
             </a:extLst>
           </p:cNvPr>
@@ -4058,9 +3990,9 @@
           <a:bodyPr/>
           <a:lstStyle/>
           <a:p>
-            <a:fld id="{C60A7808-E15F-4BAD-AC65-7EF9536A1EF5}" type="datetime1">
+            <a:fld id="{D575AF35-2CEB-45E2-9DE9-A54F7EF8A4E1}" type="datetime1">
               <a:rPr lang="fr-CH" smtClean="0"/>
-              <a:t>03.05.2022</a:t>
+              <a:t>06.05.2022</a:t>
             </a:fld>
             <a:endParaRPr lang="fr-CH"/>
           </a:p>
@@ -4071,7 +4003,7 @@
           <p:cNvPr id="5" name="Slide Number Placeholder 4">
             <a:extLst>
               <a:ext uri="{FF2B5EF4-FFF2-40B4-BE49-F238E27FC236}">
-                <a16:creationId xmlns:a16="http://schemas.microsoft.com/office/drawing/2014/main" id="{08DDDA10-2805-BDDD-FE85-7E568564B0DC}"/>
+                <a16:creationId xmlns:a16="http://schemas.microsoft.com/office/drawing/2014/main" id="{1103C3F9-4CF6-0611-77D6-0B3654325AD6}"/>
               </a:ext>
             </a:extLst>
           </p:cNvPr>
@@ -4098,7 +4030,7 @@
     </p:spTree>
     <p:extLst>
       <p:ext uri="{BB962C8B-B14F-4D97-AF65-F5344CB8AC3E}">
-        <p14:creationId xmlns:p14="http://schemas.microsoft.com/office/powerpoint/2010/main" val="4124581935"/>
+        <p14:creationId xmlns:p14="http://schemas.microsoft.com/office/powerpoint/2010/main" val="2928233556"/>
       </p:ext>
     </p:extLst>
   </p:cSld>
@@ -4130,7 +4062,7 @@
           <p:cNvPr id="2" name="Title 1">
             <a:extLst>
               <a:ext uri="{FF2B5EF4-FFF2-40B4-BE49-F238E27FC236}">
-                <a16:creationId xmlns:a16="http://schemas.microsoft.com/office/drawing/2014/main" id="{DF569038-C5CB-8FEA-3E02-8D9F85BCC747}"/>
+                <a16:creationId xmlns:a16="http://schemas.microsoft.com/office/drawing/2014/main" id="{1C151A5B-1F30-7FD7-E874-09DDE452BA29}"/>
               </a:ext>
             </a:extLst>
           </p:cNvPr>
@@ -4148,8 +4080,21 @@
           <a:p>
             <a:r>
               <a:rPr lang="fr-CH" dirty="0"/>
-              <a:t>Discussion</a:t>
-            </a:r>
+              <a:t>Our </a:t>
+            </a:r>
+            <a:r>
+              <a:rPr lang="fr-CH" dirty="0" err="1"/>
+              <a:t>scheme</a:t>
+            </a:r>
+            <a:r>
+              <a:rPr lang="fr-CH" dirty="0"/>
+              <a:t> – Fourier </a:t>
+            </a:r>
+            <a:r>
+              <a:rPr lang="fr-CH" dirty="0" err="1"/>
+              <a:t>Hashing</a:t>
+            </a:r>
+            <a:endParaRPr lang="fr-CH" dirty="0"/>
           </a:p>
         </p:txBody>
       </p:sp>
@@ -4158,7 +4103,7 @@
           <p:cNvPr id="3" name="Content Placeholder 2">
             <a:extLst>
               <a:ext uri="{FF2B5EF4-FFF2-40B4-BE49-F238E27FC236}">
-                <a16:creationId xmlns:a16="http://schemas.microsoft.com/office/drawing/2014/main" id="{4759D82E-13BE-0520-DAEF-372225758D19}"/>
+                <a16:creationId xmlns:a16="http://schemas.microsoft.com/office/drawing/2014/main" id="{D538BA7E-9B6E-042D-9A0E-8110601E4424}"/>
               </a:ext>
             </a:extLst>
           </p:cNvPr>
@@ -4175,12 +4120,24 @@
           <a:lstStyle/>
           <a:p>
             <a:r>
-              <a:rPr lang="fr-CH" dirty="0"/>
-              <a:t>Main issue: no </a:t>
-            </a:r>
-            <a:r>
-              <a:rPr lang="fr-CH" dirty="0" err="1"/>
-              <a:t>definite</a:t>
+              <a:rPr lang="fr-CH" dirty="0" err="1"/>
+              <a:t>Instead</a:t>
+            </a:r>
+            <a:r>
+              <a:rPr lang="fr-CH" dirty="0"/>
+              <a:t> of </a:t>
+            </a:r>
+            <a:r>
+              <a:rPr lang="fr-CH" dirty="0" err="1"/>
+              <a:t>generating</a:t>
+            </a:r>
+            <a:r>
+              <a:rPr lang="fr-CH" dirty="0"/>
+              <a:t> an image, </a:t>
+            </a:r>
+            <a:r>
+              <a:rPr lang="fr-CH" dirty="0" err="1"/>
+              <a:t>we</a:t>
             </a:r>
             <a:r>
               <a:rPr lang="fr-CH" dirty="0"/>
@@ -4188,15 +4145,29 @@
             </a:r>
             <a:r>
               <a:rPr lang="fr-CH" dirty="0" err="1"/>
-              <a:t>metric</a:t>
-            </a:r>
-            <a:r>
-              <a:rPr lang="fr-CH" dirty="0"/>
-              <a:t> to </a:t>
-            </a:r>
-            <a:r>
-              <a:rPr lang="fr-CH" dirty="0" err="1"/>
-              <a:t>assess</a:t>
+              <a:t>generate</a:t>
+            </a:r>
+            <a:r>
+              <a:rPr lang="fr-CH" dirty="0"/>
+              <a:t> a 2D Fourier </a:t>
+            </a:r>
+            <a:r>
+              <a:rPr lang="fr-CH" dirty="0" err="1"/>
+              <a:t>spectrum</a:t>
+            </a:r>
+            <a:r>
+              <a:rPr lang="fr-CH" dirty="0"/>
+              <a:t>.</a:t>
+            </a:r>
+          </a:p>
+          <a:p>
+            <a:r>
+              <a:rPr lang="fr-CH" dirty="0"/>
+              <a:t>To </a:t>
+            </a:r>
+            <a:r>
+              <a:rPr lang="fr-CH" dirty="0" err="1"/>
+              <a:t>get</a:t>
             </a:r>
             <a:r>
               <a:rPr lang="fr-CH" dirty="0"/>
@@ -4204,7 +4175,15 @@
             </a:r>
             <a:r>
               <a:rPr lang="fr-CH" dirty="0" err="1"/>
-              <a:t>whether</a:t>
+              <a:t>enough</a:t>
+            </a:r>
+            <a:r>
+              <a:rPr lang="fr-CH" dirty="0"/>
+              <a:t> information, </a:t>
+            </a:r>
+            <a:r>
+              <a:rPr lang="fr-CH" dirty="0" err="1"/>
+              <a:t>we</a:t>
             </a:r>
             <a:r>
               <a:rPr lang="fr-CH" dirty="0"/>
@@ -4212,74 +4191,12 @@
             </a:r>
             <a:r>
               <a:rPr lang="fr-CH" dirty="0" err="1"/>
-              <a:t>two</a:t>
-            </a:r>
-            <a:r>
-              <a:rPr lang="fr-CH" dirty="0"/>
-              <a:t> outputs are close</a:t>
-            </a:r>
-          </a:p>
-          <a:p>
-            <a:r>
-              <a:rPr lang="fr-CH" dirty="0"/>
-              <a:t>The </a:t>
-            </a:r>
-            <a:r>
-              <a:rPr lang="fr-CH" dirty="0" err="1"/>
-              <a:t>scheme</a:t>
-            </a:r>
-            <a:r>
-              <a:rPr lang="fr-CH" dirty="0"/>
-              <a:t> </a:t>
-            </a:r>
-            <a:r>
-              <a:rPr lang="fr-CH" dirty="0" err="1"/>
-              <a:t>is</a:t>
-            </a:r>
-            <a:r>
-              <a:rPr lang="fr-CH" dirty="0"/>
-              <a:t> </a:t>
-            </a:r>
-            <a:r>
-              <a:rPr lang="fr-CH" dirty="0" err="1"/>
-              <a:t>heavily</a:t>
-            </a:r>
-            <a:r>
-              <a:rPr lang="fr-CH" dirty="0"/>
-              <a:t> </a:t>
-            </a:r>
-            <a:r>
-              <a:rPr lang="fr-CH" dirty="0" err="1"/>
-              <a:t>assumption-based</a:t>
-            </a:r>
-            <a:endParaRPr lang="fr-CH" dirty="0"/>
-          </a:p>
-          <a:p>
-            <a:r>
-              <a:rPr lang="fr-CH" dirty="0"/>
-              <a:t>Main challenge: </a:t>
-            </a:r>
-            <a:r>
-              <a:rPr lang="fr-CH" dirty="0" err="1"/>
-              <a:t>every</a:t>
-            </a:r>
-            <a:r>
-              <a:rPr lang="fr-CH" dirty="0"/>
-              <a:t> bit of the hash must have the </a:t>
-            </a:r>
-            <a:r>
-              <a:rPr lang="fr-CH" dirty="0" err="1"/>
-              <a:t>same</a:t>
-            </a:r>
-            <a:r>
-              <a:rPr lang="fr-CH" dirty="0"/>
-              <a:t> «importance» in the process of the image </a:t>
-            </a:r>
-            <a:r>
-              <a:rPr lang="fr-CH" dirty="0" err="1"/>
-              <a:t>generation</a:t>
-            </a:r>
-            <a:endParaRPr lang="fr-CH" dirty="0"/>
+              <a:t>repeat</a:t>
+            </a:r>
+            <a:r>
+              <a:rPr lang="fr-CH" dirty="0"/>
+              <a:t> the process 3 times.</a:t>
+            </a:r>
           </a:p>
         </p:txBody>
       </p:sp>
@@ -4288,7 +4205,7 @@
           <p:cNvPr id="4" name="Date Placeholder 3">
             <a:extLst>
               <a:ext uri="{FF2B5EF4-FFF2-40B4-BE49-F238E27FC236}">
-                <a16:creationId xmlns:a16="http://schemas.microsoft.com/office/drawing/2014/main" id="{0288B632-BF6D-0971-5D0C-9FAE30742A9D}"/>
+                <a16:creationId xmlns:a16="http://schemas.microsoft.com/office/drawing/2014/main" id="{B7C73F1A-A92E-ACEA-3299-79EE1E946FC0}"/>
               </a:ext>
             </a:extLst>
           </p:cNvPr>
@@ -4304,9 +4221,9 @@
           <a:bodyPr/>
           <a:lstStyle/>
           <a:p>
-            <a:fld id="{E08E408D-3B93-40C6-B0B0-82611AF8414B}" type="datetime1">
+            <a:fld id="{85377DBA-2290-4E4E-8906-76198A625EFE}" type="datetime1">
               <a:rPr lang="fr-CH" smtClean="0"/>
-              <a:t>03.05.2022</a:t>
+              <a:t>06.05.2022</a:t>
             </a:fld>
             <a:endParaRPr lang="fr-CH"/>
           </a:p>
@@ -4317,7 +4234,7 @@
           <p:cNvPr id="5" name="Slide Number Placeholder 4">
             <a:extLst>
               <a:ext uri="{FF2B5EF4-FFF2-40B4-BE49-F238E27FC236}">
-                <a16:creationId xmlns:a16="http://schemas.microsoft.com/office/drawing/2014/main" id="{7439CF1F-AB10-BC91-DAFB-7A8B82B3396B}"/>
+                <a16:creationId xmlns:a16="http://schemas.microsoft.com/office/drawing/2014/main" id="{0188CCAF-1BBC-B66D-272E-FE2CD0E2726F}"/>
               </a:ext>
             </a:extLst>
           </p:cNvPr>
@@ -4344,7 +4261,850 @@
     </p:spTree>
     <p:extLst>
       <p:ext uri="{BB962C8B-B14F-4D97-AF65-F5344CB8AC3E}">
+        <p14:creationId xmlns:p14="http://schemas.microsoft.com/office/powerpoint/2010/main" val="2794819304"/>
+      </p:ext>
+    </p:extLst>
+  </p:cSld>
+  <p:clrMapOvr>
+    <a:masterClrMapping/>
+  </p:clrMapOvr>
+</p:sld>
+</file>
+
+<file path=ppt/slides/slide12.xml><?xml version="1.0" encoding="utf-8"?>
+<p:sld xmlns:a="http://schemas.openxmlformats.org/drawingml/2006/main" xmlns:r="http://schemas.openxmlformats.org/officeDocument/2006/relationships" xmlns:p="http://schemas.openxmlformats.org/presentationml/2006/main">
+  <p:cSld>
+    <p:spTree>
+      <p:nvGrpSpPr>
+        <p:cNvPr id="1" name=""/>
+        <p:cNvGrpSpPr/>
+        <p:nvPr/>
+      </p:nvGrpSpPr>
+      <p:grpSpPr>
+        <a:xfrm>
+          <a:off x="0" y="0"/>
+          <a:ext cx="0" cy="0"/>
+          <a:chOff x="0" y="0"/>
+          <a:chExt cx="0" cy="0"/>
+        </a:xfrm>
+      </p:grpSpPr>
+      <p:sp>
+        <p:nvSpPr>
+          <p:cNvPr id="2" name="Title 1">
+            <a:extLst>
+              <a:ext uri="{FF2B5EF4-FFF2-40B4-BE49-F238E27FC236}">
+                <a16:creationId xmlns:a16="http://schemas.microsoft.com/office/drawing/2014/main" id="{3F430262-9C1E-F357-013D-4A3F6E459938}"/>
+              </a:ext>
+            </a:extLst>
+          </p:cNvPr>
+          <p:cNvSpPr>
+            <a:spLocks noGrp="1"/>
+          </p:cNvSpPr>
+          <p:nvPr>
+            <p:ph type="title"/>
+          </p:nvPr>
+        </p:nvSpPr>
+        <p:spPr/>
+        <p:txBody>
+          <a:bodyPr/>
+          <a:lstStyle/>
+          <a:p>
+            <a:r>
+              <a:rPr lang="fr-CH" dirty="0"/>
+              <a:t>Our </a:t>
+            </a:r>
+            <a:r>
+              <a:rPr lang="fr-CH" dirty="0" err="1"/>
+              <a:t>scheme</a:t>
+            </a:r>
+            <a:r>
+              <a:rPr lang="fr-CH" dirty="0"/>
+              <a:t> – Fourier </a:t>
+            </a:r>
+            <a:r>
+              <a:rPr lang="fr-CH" dirty="0" err="1"/>
+              <a:t>Hashing</a:t>
+            </a:r>
+            <a:r>
+              <a:rPr lang="fr-CH" dirty="0"/>
+              <a:t> 2</a:t>
+            </a:r>
+          </a:p>
+        </p:txBody>
+      </p:sp>
+      <p:sp>
+        <p:nvSpPr>
+          <p:cNvPr id="3" name="Content Placeholder 2">
+            <a:extLst>
+              <a:ext uri="{FF2B5EF4-FFF2-40B4-BE49-F238E27FC236}">
+                <a16:creationId xmlns:a16="http://schemas.microsoft.com/office/drawing/2014/main" id="{F5C73729-33F8-5104-B78C-9BEFBBA1C5BE}"/>
+              </a:ext>
+            </a:extLst>
+          </p:cNvPr>
+          <p:cNvSpPr>
+            <a:spLocks noGrp="1"/>
+          </p:cNvSpPr>
+          <p:nvPr>
+            <p:ph idx="1"/>
+          </p:nvPr>
+        </p:nvSpPr>
+        <p:spPr/>
+        <p:txBody>
+          <a:bodyPr/>
+          <a:lstStyle/>
+          <a:p>
+            <a:r>
+              <a:rPr lang="fr-CH" dirty="0"/>
+              <a:t>Once the </a:t>
+            </a:r>
+            <a:r>
+              <a:rPr lang="fr-CH" dirty="0" err="1"/>
+              <a:t>functions</a:t>
+            </a:r>
+            <a:r>
+              <a:rPr lang="fr-CH" dirty="0"/>
+              <a:t> are </a:t>
+            </a:r>
+            <a:r>
+              <a:rPr lang="fr-CH" dirty="0" err="1"/>
+              <a:t>generated</a:t>
+            </a:r>
+            <a:r>
+              <a:rPr lang="fr-CH" dirty="0"/>
+              <a:t>, </a:t>
+            </a:r>
+            <a:r>
+              <a:rPr lang="fr-CH" dirty="0" err="1"/>
+              <a:t>we</a:t>
+            </a:r>
+            <a:r>
+              <a:rPr lang="fr-CH" dirty="0"/>
+              <a:t> </a:t>
+            </a:r>
+            <a:r>
+              <a:rPr lang="fr-CH" dirty="0" err="1"/>
+              <a:t>sample</a:t>
+            </a:r>
+            <a:r>
+              <a:rPr lang="fr-CH" dirty="0"/>
+              <a:t> the </a:t>
+            </a:r>
+            <a:r>
+              <a:rPr lang="fr-CH" dirty="0" err="1"/>
+              <a:t>colors</a:t>
+            </a:r>
+            <a:r>
+              <a:rPr lang="fr-CH" dirty="0"/>
+              <a:t> </a:t>
+            </a:r>
+            <a:r>
+              <a:rPr lang="fr-CH" dirty="0" err="1"/>
+              <a:t>directly</a:t>
+            </a:r>
+            <a:r>
+              <a:rPr lang="fr-CH" dirty="0"/>
+              <a:t> </a:t>
+            </a:r>
+            <a:r>
+              <a:rPr lang="fr-CH" dirty="0" err="1"/>
+              <a:t>from</a:t>
+            </a:r>
+            <a:r>
+              <a:rPr lang="fr-CH" dirty="0"/>
+              <a:t> the hash.</a:t>
+            </a:r>
+          </a:p>
+        </p:txBody>
+      </p:sp>
+      <p:sp>
+        <p:nvSpPr>
+          <p:cNvPr id="4" name="Date Placeholder 3">
+            <a:extLst>
+              <a:ext uri="{FF2B5EF4-FFF2-40B4-BE49-F238E27FC236}">
+                <a16:creationId xmlns:a16="http://schemas.microsoft.com/office/drawing/2014/main" id="{4389FF5F-F4BA-3FC3-B5E1-A9F885AD8DB5}"/>
+              </a:ext>
+            </a:extLst>
+          </p:cNvPr>
+          <p:cNvSpPr>
+            <a:spLocks noGrp="1"/>
+          </p:cNvSpPr>
+          <p:nvPr>
+            <p:ph type="dt" sz="half" idx="10"/>
+          </p:nvPr>
+        </p:nvSpPr>
+        <p:spPr/>
+        <p:txBody>
+          <a:bodyPr/>
+          <a:lstStyle/>
+          <a:p>
+            <a:fld id="{03261FD3-B7B8-459E-A57A-2BC755413D80}" type="datetime1">
+              <a:rPr lang="fr-CH" smtClean="0"/>
+              <a:t>06.05.2022</a:t>
+            </a:fld>
+            <a:endParaRPr lang="fr-CH"/>
+          </a:p>
+        </p:txBody>
+      </p:sp>
+      <p:sp>
+        <p:nvSpPr>
+          <p:cNvPr id="5" name="Slide Number Placeholder 4">
+            <a:extLst>
+              <a:ext uri="{FF2B5EF4-FFF2-40B4-BE49-F238E27FC236}">
+                <a16:creationId xmlns:a16="http://schemas.microsoft.com/office/drawing/2014/main" id="{39CE135F-D840-093F-031C-C50109572F35}"/>
+              </a:ext>
+            </a:extLst>
+          </p:cNvPr>
+          <p:cNvSpPr>
+            <a:spLocks noGrp="1"/>
+          </p:cNvSpPr>
+          <p:nvPr>
+            <p:ph type="sldNum" sz="quarter" idx="12"/>
+          </p:nvPr>
+        </p:nvSpPr>
+        <p:spPr/>
+        <p:txBody>
+          <a:bodyPr/>
+          <a:lstStyle/>
+          <a:p>
+            <a:fld id="{CD36EB9B-5452-4822-AF0B-FE34A9642046}" type="slidenum">
+              <a:rPr lang="fr-CH" smtClean="0"/>
+              <a:t>12</a:t>
+            </a:fld>
+            <a:endParaRPr lang="fr-CH"/>
+          </a:p>
+        </p:txBody>
+      </p:sp>
+    </p:spTree>
+    <p:extLst>
+      <p:ext uri="{BB962C8B-B14F-4D97-AF65-F5344CB8AC3E}">
+        <p14:creationId xmlns:p14="http://schemas.microsoft.com/office/powerpoint/2010/main" val="2032170742"/>
+      </p:ext>
+    </p:extLst>
+  </p:cSld>
+  <p:clrMapOvr>
+    <a:masterClrMapping/>
+  </p:clrMapOvr>
+</p:sld>
+</file>
+
+<file path=ppt/slides/slide13.xml><?xml version="1.0" encoding="utf-8"?>
+<p:sld xmlns:a="http://schemas.openxmlformats.org/drawingml/2006/main" xmlns:r="http://schemas.openxmlformats.org/officeDocument/2006/relationships" xmlns:p="http://schemas.openxmlformats.org/presentationml/2006/main">
+  <p:cSld>
+    <p:spTree>
+      <p:nvGrpSpPr>
+        <p:cNvPr id="1" name=""/>
+        <p:cNvGrpSpPr/>
+        <p:nvPr/>
+      </p:nvGrpSpPr>
+      <p:grpSpPr>
+        <a:xfrm>
+          <a:off x="0" y="0"/>
+          <a:ext cx="0" cy="0"/>
+          <a:chOff x="0" y="0"/>
+          <a:chExt cx="0" cy="0"/>
+        </a:xfrm>
+      </p:grpSpPr>
+      <p:sp>
+        <p:nvSpPr>
+          <p:cNvPr id="2" name="Title 1">
+            <a:extLst>
+              <a:ext uri="{FF2B5EF4-FFF2-40B4-BE49-F238E27FC236}">
+                <a16:creationId xmlns:a16="http://schemas.microsoft.com/office/drawing/2014/main" id="{5E41EE68-C07C-9633-A415-220F89C53BB9}"/>
+              </a:ext>
+            </a:extLst>
+          </p:cNvPr>
+          <p:cNvSpPr>
+            <a:spLocks noGrp="1"/>
+          </p:cNvSpPr>
+          <p:nvPr>
+            <p:ph type="title"/>
+          </p:nvPr>
+        </p:nvSpPr>
+        <p:spPr/>
+        <p:txBody>
+          <a:bodyPr/>
+          <a:lstStyle/>
+          <a:p>
+            <a:r>
+              <a:rPr lang="fr-CH" dirty="0"/>
+              <a:t>Our </a:t>
+            </a:r>
+            <a:r>
+              <a:rPr lang="fr-CH" dirty="0" err="1"/>
+              <a:t>scheme</a:t>
+            </a:r>
+            <a:r>
+              <a:rPr lang="fr-CH" dirty="0"/>
+              <a:t> – Fourier </a:t>
+            </a:r>
+            <a:r>
+              <a:rPr lang="fr-CH" dirty="0" err="1"/>
+              <a:t>Hashing</a:t>
+            </a:r>
+            <a:r>
+              <a:rPr lang="fr-CH" dirty="0"/>
+              <a:t> 3</a:t>
+            </a:r>
+          </a:p>
+        </p:txBody>
+      </p:sp>
+      <p:sp>
+        <p:nvSpPr>
+          <p:cNvPr id="3" name="Content Placeholder 2">
+            <a:extLst>
+              <a:ext uri="{FF2B5EF4-FFF2-40B4-BE49-F238E27FC236}">
+                <a16:creationId xmlns:a16="http://schemas.microsoft.com/office/drawing/2014/main" id="{91E0B8C4-879E-C836-E2D7-2BE1D742DC05}"/>
+              </a:ext>
+            </a:extLst>
+          </p:cNvPr>
+          <p:cNvSpPr>
+            <a:spLocks noGrp="1"/>
+          </p:cNvSpPr>
+          <p:nvPr>
+            <p:ph idx="1"/>
+          </p:nvPr>
+        </p:nvSpPr>
+        <p:spPr/>
+        <p:txBody>
+          <a:bodyPr/>
+          <a:lstStyle/>
+          <a:p>
+            <a:r>
+              <a:rPr lang="fr-CH" dirty="0" err="1"/>
+              <a:t>Finally</a:t>
+            </a:r>
+            <a:r>
+              <a:rPr lang="fr-CH" dirty="0"/>
+              <a:t>, </a:t>
+            </a:r>
+            <a:r>
+              <a:rPr lang="fr-CH" dirty="0" err="1"/>
+              <a:t>we</a:t>
+            </a:r>
+            <a:r>
+              <a:rPr lang="fr-CH" dirty="0"/>
+              <a:t> </a:t>
+            </a:r>
+            <a:r>
+              <a:rPr lang="fr-CH" dirty="0" err="1"/>
+              <a:t>add</a:t>
+            </a:r>
+            <a:r>
+              <a:rPr lang="fr-CH" dirty="0"/>
+              <a:t> </a:t>
+            </a:r>
+            <a:r>
+              <a:rPr lang="fr-CH" dirty="0" err="1"/>
+              <a:t>symmetry</a:t>
+            </a:r>
+            <a:r>
+              <a:rPr lang="fr-CH" dirty="0"/>
+              <a:t>, to help </a:t>
+            </a:r>
+            <a:r>
+              <a:rPr lang="fr-CH" dirty="0" err="1"/>
+              <a:t>recognizability</a:t>
+            </a:r>
+            <a:r>
+              <a:rPr lang="fr-CH" dirty="0"/>
+              <a:t>.</a:t>
+            </a:r>
+          </a:p>
+          <a:p>
+            <a:r>
+              <a:rPr lang="fr-CH" dirty="0"/>
+              <a:t>The </a:t>
+            </a:r>
+            <a:r>
+              <a:rPr lang="fr-CH" dirty="0" err="1"/>
+              <a:t>symmetry</a:t>
+            </a:r>
+            <a:r>
+              <a:rPr lang="fr-CH" dirty="0"/>
+              <a:t> mode (</a:t>
+            </a:r>
+            <a:r>
+              <a:rPr lang="fr-CH" dirty="0" err="1"/>
+              <a:t>e.g</a:t>
+            </a:r>
+            <a:r>
+              <a:rPr lang="fr-CH" dirty="0"/>
+              <a:t> vertical, horizontal, diagonal,…) </a:t>
+            </a:r>
+            <a:r>
+              <a:rPr lang="fr-CH" dirty="0" err="1"/>
+              <a:t>is</a:t>
+            </a:r>
+            <a:r>
+              <a:rPr lang="fr-CH" dirty="0"/>
+              <a:t> </a:t>
+            </a:r>
+            <a:r>
+              <a:rPr lang="fr-CH" dirty="0" err="1"/>
+              <a:t>extracted</a:t>
+            </a:r>
+            <a:r>
+              <a:rPr lang="fr-CH" dirty="0"/>
+              <a:t> </a:t>
+            </a:r>
+            <a:r>
+              <a:rPr lang="fr-CH" dirty="0" err="1"/>
+              <a:t>from</a:t>
+            </a:r>
+            <a:r>
+              <a:rPr lang="fr-CH" dirty="0"/>
+              <a:t> the hash</a:t>
+            </a:r>
+          </a:p>
+        </p:txBody>
+      </p:sp>
+      <p:sp>
+        <p:nvSpPr>
+          <p:cNvPr id="4" name="Date Placeholder 3">
+            <a:extLst>
+              <a:ext uri="{FF2B5EF4-FFF2-40B4-BE49-F238E27FC236}">
+                <a16:creationId xmlns:a16="http://schemas.microsoft.com/office/drawing/2014/main" id="{94F7E2EB-8682-430B-5F5B-86AC9CA5325F}"/>
+              </a:ext>
+            </a:extLst>
+          </p:cNvPr>
+          <p:cNvSpPr>
+            <a:spLocks noGrp="1"/>
+          </p:cNvSpPr>
+          <p:nvPr>
+            <p:ph type="dt" sz="half" idx="10"/>
+          </p:nvPr>
+        </p:nvSpPr>
+        <p:spPr/>
+        <p:txBody>
+          <a:bodyPr/>
+          <a:lstStyle/>
+          <a:p>
+            <a:fld id="{C60A7808-E15F-4BAD-AC65-7EF9536A1EF5}" type="datetime1">
+              <a:rPr lang="fr-CH" smtClean="0"/>
+              <a:t>06.05.2022</a:t>
+            </a:fld>
+            <a:endParaRPr lang="fr-CH"/>
+          </a:p>
+        </p:txBody>
+      </p:sp>
+      <p:sp>
+        <p:nvSpPr>
+          <p:cNvPr id="5" name="Slide Number Placeholder 4">
+            <a:extLst>
+              <a:ext uri="{FF2B5EF4-FFF2-40B4-BE49-F238E27FC236}">
+                <a16:creationId xmlns:a16="http://schemas.microsoft.com/office/drawing/2014/main" id="{08DDDA10-2805-BDDD-FE85-7E568564B0DC}"/>
+              </a:ext>
+            </a:extLst>
+          </p:cNvPr>
+          <p:cNvSpPr>
+            <a:spLocks noGrp="1"/>
+          </p:cNvSpPr>
+          <p:nvPr>
+            <p:ph type="sldNum" sz="quarter" idx="12"/>
+          </p:nvPr>
+        </p:nvSpPr>
+        <p:spPr/>
+        <p:txBody>
+          <a:bodyPr/>
+          <a:lstStyle/>
+          <a:p>
+            <a:fld id="{CD36EB9B-5452-4822-AF0B-FE34A9642046}" type="slidenum">
+              <a:rPr lang="fr-CH" smtClean="0"/>
+              <a:t>13</a:t>
+            </a:fld>
+            <a:endParaRPr lang="fr-CH"/>
+          </a:p>
+        </p:txBody>
+      </p:sp>
+    </p:spTree>
+    <p:extLst>
+      <p:ext uri="{BB962C8B-B14F-4D97-AF65-F5344CB8AC3E}">
+        <p14:creationId xmlns:p14="http://schemas.microsoft.com/office/powerpoint/2010/main" val="4124581935"/>
+      </p:ext>
+    </p:extLst>
+  </p:cSld>
+  <p:clrMapOvr>
+    <a:masterClrMapping/>
+  </p:clrMapOvr>
+</p:sld>
+</file>
+
+<file path=ppt/slides/slide14.xml><?xml version="1.0" encoding="utf-8"?>
+<p:sld xmlns:a="http://schemas.openxmlformats.org/drawingml/2006/main" xmlns:r="http://schemas.openxmlformats.org/officeDocument/2006/relationships" xmlns:p="http://schemas.openxmlformats.org/presentationml/2006/main">
+  <p:cSld>
+    <p:spTree>
+      <p:nvGrpSpPr>
+        <p:cNvPr id="1" name=""/>
+        <p:cNvGrpSpPr/>
+        <p:nvPr/>
+      </p:nvGrpSpPr>
+      <p:grpSpPr>
+        <a:xfrm>
+          <a:off x="0" y="0"/>
+          <a:ext cx="0" cy="0"/>
+          <a:chOff x="0" y="0"/>
+          <a:chExt cx="0" cy="0"/>
+        </a:xfrm>
+      </p:grpSpPr>
+      <p:sp>
+        <p:nvSpPr>
+          <p:cNvPr id="2" name="Title 1">
+            <a:extLst>
+              <a:ext uri="{FF2B5EF4-FFF2-40B4-BE49-F238E27FC236}">
+                <a16:creationId xmlns:a16="http://schemas.microsoft.com/office/drawing/2014/main" id="{DF569038-C5CB-8FEA-3E02-8D9F85BCC747}"/>
+              </a:ext>
+            </a:extLst>
+          </p:cNvPr>
+          <p:cNvSpPr>
+            <a:spLocks noGrp="1"/>
+          </p:cNvSpPr>
+          <p:nvPr>
+            <p:ph type="title"/>
+          </p:nvPr>
+        </p:nvSpPr>
+        <p:spPr/>
+        <p:txBody>
+          <a:bodyPr/>
+          <a:lstStyle/>
+          <a:p>
+            <a:r>
+              <a:rPr lang="fr-CH" dirty="0"/>
+              <a:t>Discussion</a:t>
+            </a:r>
+          </a:p>
+        </p:txBody>
+      </p:sp>
+      <p:sp>
+        <p:nvSpPr>
+          <p:cNvPr id="3" name="Content Placeholder 2">
+            <a:extLst>
+              <a:ext uri="{FF2B5EF4-FFF2-40B4-BE49-F238E27FC236}">
+                <a16:creationId xmlns:a16="http://schemas.microsoft.com/office/drawing/2014/main" id="{4759D82E-13BE-0520-DAEF-372225758D19}"/>
+              </a:ext>
+            </a:extLst>
+          </p:cNvPr>
+          <p:cNvSpPr>
+            <a:spLocks noGrp="1"/>
+          </p:cNvSpPr>
+          <p:nvPr>
+            <p:ph idx="1"/>
+          </p:nvPr>
+        </p:nvSpPr>
+        <p:spPr/>
+        <p:txBody>
+          <a:bodyPr/>
+          <a:lstStyle/>
+          <a:p>
+            <a:r>
+              <a:rPr lang="fr-CH" dirty="0"/>
+              <a:t>Main issue: no </a:t>
+            </a:r>
+            <a:r>
+              <a:rPr lang="fr-CH" dirty="0" err="1"/>
+              <a:t>definite</a:t>
+            </a:r>
+            <a:r>
+              <a:rPr lang="fr-CH" dirty="0"/>
+              <a:t> </a:t>
+            </a:r>
+            <a:r>
+              <a:rPr lang="fr-CH" dirty="0" err="1"/>
+              <a:t>metric</a:t>
+            </a:r>
+            <a:r>
+              <a:rPr lang="fr-CH" dirty="0"/>
+              <a:t> to </a:t>
+            </a:r>
+            <a:r>
+              <a:rPr lang="fr-CH" dirty="0" err="1"/>
+              <a:t>assess</a:t>
+            </a:r>
+            <a:r>
+              <a:rPr lang="fr-CH" dirty="0"/>
+              <a:t> </a:t>
+            </a:r>
+            <a:r>
+              <a:rPr lang="fr-CH" dirty="0" err="1"/>
+              <a:t>whether</a:t>
+            </a:r>
+            <a:r>
+              <a:rPr lang="fr-CH" dirty="0"/>
+              <a:t> </a:t>
+            </a:r>
+            <a:r>
+              <a:rPr lang="fr-CH" dirty="0" err="1"/>
+              <a:t>two</a:t>
+            </a:r>
+            <a:r>
+              <a:rPr lang="fr-CH" dirty="0"/>
+              <a:t> outputs are close</a:t>
+            </a:r>
+          </a:p>
+          <a:p>
+            <a:r>
+              <a:rPr lang="fr-CH" dirty="0"/>
+              <a:t>The </a:t>
+            </a:r>
+            <a:r>
+              <a:rPr lang="fr-CH" dirty="0" err="1"/>
+              <a:t>scheme</a:t>
+            </a:r>
+            <a:r>
+              <a:rPr lang="fr-CH" dirty="0"/>
+              <a:t> </a:t>
+            </a:r>
+            <a:r>
+              <a:rPr lang="fr-CH" dirty="0" err="1"/>
+              <a:t>is</a:t>
+            </a:r>
+            <a:r>
+              <a:rPr lang="fr-CH" dirty="0"/>
+              <a:t> </a:t>
+            </a:r>
+            <a:r>
+              <a:rPr lang="fr-CH" dirty="0" err="1"/>
+              <a:t>heavily</a:t>
+            </a:r>
+            <a:r>
+              <a:rPr lang="fr-CH" dirty="0"/>
+              <a:t> </a:t>
+            </a:r>
+            <a:r>
+              <a:rPr lang="fr-CH" dirty="0" err="1"/>
+              <a:t>assumption-based</a:t>
+            </a:r>
+            <a:endParaRPr lang="fr-CH" dirty="0"/>
+          </a:p>
+        </p:txBody>
+      </p:sp>
+      <p:sp>
+        <p:nvSpPr>
+          <p:cNvPr id="4" name="Date Placeholder 3">
+            <a:extLst>
+              <a:ext uri="{FF2B5EF4-FFF2-40B4-BE49-F238E27FC236}">
+                <a16:creationId xmlns:a16="http://schemas.microsoft.com/office/drawing/2014/main" id="{0288B632-BF6D-0971-5D0C-9FAE30742A9D}"/>
+              </a:ext>
+            </a:extLst>
+          </p:cNvPr>
+          <p:cNvSpPr>
+            <a:spLocks noGrp="1"/>
+          </p:cNvSpPr>
+          <p:nvPr>
+            <p:ph type="dt" sz="half" idx="10"/>
+          </p:nvPr>
+        </p:nvSpPr>
+        <p:spPr/>
+        <p:txBody>
+          <a:bodyPr/>
+          <a:lstStyle/>
+          <a:p>
+            <a:fld id="{E08E408D-3B93-40C6-B0B0-82611AF8414B}" type="datetime1">
+              <a:rPr lang="fr-CH" smtClean="0"/>
+              <a:t>06.05.2022</a:t>
+            </a:fld>
+            <a:endParaRPr lang="fr-CH"/>
+          </a:p>
+        </p:txBody>
+      </p:sp>
+      <p:sp>
+        <p:nvSpPr>
+          <p:cNvPr id="5" name="Slide Number Placeholder 4">
+            <a:extLst>
+              <a:ext uri="{FF2B5EF4-FFF2-40B4-BE49-F238E27FC236}">
+                <a16:creationId xmlns:a16="http://schemas.microsoft.com/office/drawing/2014/main" id="{7439CF1F-AB10-BC91-DAFB-7A8B82B3396B}"/>
+              </a:ext>
+            </a:extLst>
+          </p:cNvPr>
+          <p:cNvSpPr>
+            <a:spLocks noGrp="1"/>
+          </p:cNvSpPr>
+          <p:nvPr>
+            <p:ph type="sldNum" sz="quarter" idx="12"/>
+          </p:nvPr>
+        </p:nvSpPr>
+        <p:spPr/>
+        <p:txBody>
+          <a:bodyPr/>
+          <a:lstStyle/>
+          <a:p>
+            <a:fld id="{CD36EB9B-5452-4822-AF0B-FE34A9642046}" type="slidenum">
+              <a:rPr lang="fr-CH" smtClean="0"/>
+              <a:t>14</a:t>
+            </a:fld>
+            <a:endParaRPr lang="fr-CH"/>
+          </a:p>
+        </p:txBody>
+      </p:sp>
+    </p:spTree>
+    <p:extLst>
+      <p:ext uri="{BB962C8B-B14F-4D97-AF65-F5344CB8AC3E}">
         <p14:creationId xmlns:p14="http://schemas.microsoft.com/office/powerpoint/2010/main" val="2147636922"/>
+      </p:ext>
+    </p:extLst>
+  </p:cSld>
+  <p:clrMapOvr>
+    <a:masterClrMapping/>
+  </p:clrMapOvr>
+</p:sld>
+</file>
+
+<file path=ppt/slides/slide15.xml><?xml version="1.0" encoding="utf-8"?>
+<p:sld xmlns:a="http://schemas.openxmlformats.org/drawingml/2006/main" xmlns:r="http://schemas.openxmlformats.org/officeDocument/2006/relationships" xmlns:p="http://schemas.openxmlformats.org/presentationml/2006/main">
+  <p:cSld>
+    <p:spTree>
+      <p:nvGrpSpPr>
+        <p:cNvPr id="1" name=""/>
+        <p:cNvGrpSpPr/>
+        <p:nvPr/>
+      </p:nvGrpSpPr>
+      <p:grpSpPr>
+        <a:xfrm>
+          <a:off x="0" y="0"/>
+          <a:ext cx="0" cy="0"/>
+          <a:chOff x="0" y="0"/>
+          <a:chExt cx="0" cy="0"/>
+        </a:xfrm>
+      </p:grpSpPr>
+      <p:sp>
+        <p:nvSpPr>
+          <p:cNvPr id="2" name="Title 1">
+            <a:extLst>
+              <a:ext uri="{FF2B5EF4-FFF2-40B4-BE49-F238E27FC236}">
+                <a16:creationId xmlns:a16="http://schemas.microsoft.com/office/drawing/2014/main" id="{5B030993-58EC-481D-D0AD-3B7471A11507}"/>
+              </a:ext>
+            </a:extLst>
+          </p:cNvPr>
+          <p:cNvSpPr>
+            <a:spLocks noGrp="1"/>
+          </p:cNvSpPr>
+          <p:nvPr>
+            <p:ph type="title"/>
+          </p:nvPr>
+        </p:nvSpPr>
+        <p:spPr/>
+        <p:txBody>
+          <a:bodyPr/>
+          <a:lstStyle/>
+          <a:p>
+            <a:r>
+              <a:rPr lang="fr-CH" dirty="0"/>
+              <a:t>Next </a:t>
+            </a:r>
+            <a:r>
+              <a:rPr lang="fr-CH" dirty="0" err="1"/>
+              <a:t>steps</a:t>
+            </a:r>
+            <a:endParaRPr lang="fr-CH" dirty="0"/>
+          </a:p>
+        </p:txBody>
+      </p:sp>
+      <p:sp>
+        <p:nvSpPr>
+          <p:cNvPr id="3" name="Content Placeholder 2">
+            <a:extLst>
+              <a:ext uri="{FF2B5EF4-FFF2-40B4-BE49-F238E27FC236}">
+                <a16:creationId xmlns:a16="http://schemas.microsoft.com/office/drawing/2014/main" id="{B1723E89-D75A-B332-CDE7-675B31139C30}"/>
+              </a:ext>
+            </a:extLst>
+          </p:cNvPr>
+          <p:cNvSpPr>
+            <a:spLocks noGrp="1"/>
+          </p:cNvSpPr>
+          <p:nvPr>
+            <p:ph idx="1"/>
+          </p:nvPr>
+        </p:nvSpPr>
+        <p:spPr/>
+        <p:txBody>
+          <a:bodyPr/>
+          <a:lstStyle/>
+          <a:p>
+            <a:r>
+              <a:rPr lang="fr-CH" dirty="0" err="1"/>
+              <a:t>Implementation</a:t>
+            </a:r>
+            <a:endParaRPr lang="fr-CH" dirty="0"/>
+          </a:p>
+          <a:p>
+            <a:r>
+              <a:rPr lang="fr-CH" dirty="0"/>
+              <a:t>Formalisation</a:t>
+            </a:r>
+          </a:p>
+          <a:p>
+            <a:r>
+              <a:rPr lang="fr-CH" dirty="0" err="1"/>
+              <a:t>Testing</a:t>
+            </a:r>
+            <a:r>
+              <a:rPr lang="fr-CH" dirty="0"/>
+              <a:t> ?</a:t>
+            </a:r>
+          </a:p>
+        </p:txBody>
+      </p:sp>
+      <p:sp>
+        <p:nvSpPr>
+          <p:cNvPr id="4" name="Date Placeholder 3">
+            <a:extLst>
+              <a:ext uri="{FF2B5EF4-FFF2-40B4-BE49-F238E27FC236}">
+                <a16:creationId xmlns:a16="http://schemas.microsoft.com/office/drawing/2014/main" id="{1656DBCD-C2F2-F5FD-CE90-9CABB066EE85}"/>
+              </a:ext>
+            </a:extLst>
+          </p:cNvPr>
+          <p:cNvSpPr>
+            <a:spLocks noGrp="1"/>
+          </p:cNvSpPr>
+          <p:nvPr>
+            <p:ph type="dt" sz="half" idx="10"/>
+          </p:nvPr>
+        </p:nvSpPr>
+        <p:spPr/>
+        <p:txBody>
+          <a:bodyPr/>
+          <a:lstStyle/>
+          <a:p>
+            <a:fld id="{D575AF35-2CEB-45E2-9DE9-A54F7EF8A4E1}" type="datetime1">
+              <a:rPr lang="fr-CH" smtClean="0"/>
+              <a:t>06.05.2022</a:t>
+            </a:fld>
+            <a:endParaRPr lang="fr-CH"/>
+          </a:p>
+        </p:txBody>
+      </p:sp>
+      <p:sp>
+        <p:nvSpPr>
+          <p:cNvPr id="5" name="Slide Number Placeholder 4">
+            <a:extLst>
+              <a:ext uri="{FF2B5EF4-FFF2-40B4-BE49-F238E27FC236}">
+                <a16:creationId xmlns:a16="http://schemas.microsoft.com/office/drawing/2014/main" id="{94B14E07-16AD-A5DF-ECB3-47EAC92E05FF}"/>
+              </a:ext>
+            </a:extLst>
+          </p:cNvPr>
+          <p:cNvSpPr>
+            <a:spLocks noGrp="1"/>
+          </p:cNvSpPr>
+          <p:nvPr>
+            <p:ph type="sldNum" sz="quarter" idx="12"/>
+          </p:nvPr>
+        </p:nvSpPr>
+        <p:spPr/>
+        <p:txBody>
+          <a:bodyPr/>
+          <a:lstStyle/>
+          <a:p>
+            <a:fld id="{CD36EB9B-5452-4822-AF0B-FE34A9642046}" type="slidenum">
+              <a:rPr lang="fr-CH" smtClean="0"/>
+              <a:t>15</a:t>
+            </a:fld>
+            <a:endParaRPr lang="fr-CH"/>
+          </a:p>
+        </p:txBody>
+      </p:sp>
+    </p:spTree>
+    <p:extLst>
+      <p:ext uri="{BB962C8B-B14F-4D97-AF65-F5344CB8AC3E}">
+        <p14:creationId xmlns:p14="http://schemas.microsoft.com/office/powerpoint/2010/main" val="2372377658"/>
       </p:ext>
     </p:extLst>
   </p:cSld>
@@ -4543,7 +5303,7 @@
           <a:p>
             <a:fld id="{CB3E2417-67AF-4205-860C-2FF0E178F01E}" type="datetime1">
               <a:rPr lang="fr-CH" smtClean="0"/>
-              <a:t>03.05.2022</a:t>
+              <a:t>06.05.2022</a:t>
             </a:fld>
             <a:endParaRPr lang="fr-CH"/>
           </a:p>
@@ -4875,7 +5635,7 @@
           <a:p>
             <a:fld id="{C2072472-D065-42EF-A848-3C1A5FC04C40}" type="datetime1">
               <a:rPr lang="fr-CH" smtClean="0"/>
-              <a:t>03.05.2022</a:t>
+              <a:t>06.05.2022</a:t>
             </a:fld>
             <a:endParaRPr lang="fr-CH"/>
           </a:p>
@@ -5103,10 +5863,399 @@
       </p:sp>
       <p:sp>
         <p:nvSpPr>
-          <p:cNvPr id="4" name="Content Placeholder 2">
-            <a:extLst>
-              <a:ext uri="{FF2B5EF4-FFF2-40B4-BE49-F238E27FC236}">
-                <a16:creationId xmlns:a16="http://schemas.microsoft.com/office/drawing/2014/main" id="{F88BFCBF-379A-EB02-B37A-5196B3A2721E}"/>
+          <p:cNvPr id="5" name="Date Placeholder 4">
+            <a:extLst>
+              <a:ext uri="{FF2B5EF4-FFF2-40B4-BE49-F238E27FC236}">
+                <a16:creationId xmlns:a16="http://schemas.microsoft.com/office/drawing/2014/main" id="{1EA9F5C1-C849-53F7-4FDA-2CD4FDF56463}"/>
+              </a:ext>
+            </a:extLst>
+          </p:cNvPr>
+          <p:cNvSpPr>
+            <a:spLocks noGrp="1"/>
+          </p:cNvSpPr>
+          <p:nvPr>
+            <p:ph type="dt" sz="half" idx="10"/>
+          </p:nvPr>
+        </p:nvSpPr>
+        <p:spPr/>
+        <p:txBody>
+          <a:bodyPr/>
+          <a:lstStyle/>
+          <a:p>
+            <a:fld id="{96D717B7-0F2C-4AE9-80E5-212D14DE2157}" type="datetime1">
+              <a:rPr lang="fr-CH" smtClean="0"/>
+              <a:t>06.05.2022</a:t>
+            </a:fld>
+            <a:endParaRPr lang="fr-CH"/>
+          </a:p>
+        </p:txBody>
+      </p:sp>
+      <p:sp>
+        <p:nvSpPr>
+          <p:cNvPr id="6" name="Slide Number Placeholder 5">
+            <a:extLst>
+              <a:ext uri="{FF2B5EF4-FFF2-40B4-BE49-F238E27FC236}">
+                <a16:creationId xmlns:a16="http://schemas.microsoft.com/office/drawing/2014/main" id="{468D737C-A7B6-998D-330C-8F7908E197D8}"/>
+              </a:ext>
+            </a:extLst>
+          </p:cNvPr>
+          <p:cNvSpPr>
+            <a:spLocks noGrp="1"/>
+          </p:cNvSpPr>
+          <p:nvPr>
+            <p:ph type="sldNum" sz="quarter" idx="12"/>
+          </p:nvPr>
+        </p:nvSpPr>
+        <p:spPr/>
+        <p:txBody>
+          <a:bodyPr/>
+          <a:lstStyle/>
+          <a:p>
+            <a:fld id="{CD36EB9B-5452-4822-AF0B-FE34A9642046}" type="slidenum">
+              <a:rPr lang="fr-CH" smtClean="0"/>
+              <a:t>4</a:t>
+            </a:fld>
+            <a:endParaRPr lang="fr-CH"/>
+          </a:p>
+        </p:txBody>
+      </p:sp>
+      <p:grpSp>
+        <p:nvGrpSpPr>
+          <p:cNvPr id="14" name="Group 13">
+            <a:extLst>
+              <a:ext uri="{FF2B5EF4-FFF2-40B4-BE49-F238E27FC236}">
+                <a16:creationId xmlns:a16="http://schemas.microsoft.com/office/drawing/2014/main" id="{0E6B41FF-4F87-AAC5-D37A-898D37A8DE68}"/>
+              </a:ext>
+            </a:extLst>
+          </p:cNvPr>
+          <p:cNvGrpSpPr/>
+          <p:nvPr/>
+        </p:nvGrpSpPr>
+        <p:grpSpPr>
+          <a:xfrm>
+            <a:off x="6301740" y="3478346"/>
+            <a:ext cx="2503714" cy="2503714"/>
+            <a:chOff x="6301740" y="3478346"/>
+            <a:chExt cx="2503714" cy="2503714"/>
+          </a:xfrm>
+        </p:grpSpPr>
+        <p:pic>
+          <p:nvPicPr>
+            <p:cNvPr id="13" name="Graphic 12" descr="Smart Phone with solid fill">
+              <a:extLst>
+                <a:ext uri="{FF2B5EF4-FFF2-40B4-BE49-F238E27FC236}">
+                  <a16:creationId xmlns:a16="http://schemas.microsoft.com/office/drawing/2014/main" id="{E31EE0DB-BE5C-00A7-6A5E-74F46CCE9566}"/>
+                </a:ext>
+              </a:extLst>
+            </p:cNvPr>
+            <p:cNvPicPr>
+              <a:picLocks noChangeAspect="1"/>
+            </p:cNvPicPr>
+            <p:nvPr/>
+          </p:nvPicPr>
+          <p:blipFill>
+            <a:blip r:embed="rId2">
+              <a:extLst>
+                <a:ext uri="{28A0092B-C50C-407E-A947-70E740481C1C}">
+                  <a14:useLocalDpi xmlns:a14="http://schemas.microsoft.com/office/drawing/2010/main" val="0"/>
+                </a:ext>
+                <a:ext uri="{96DAC541-7B7A-43D3-8B79-37D633B846F1}">
+                  <asvg:svgBlip xmlns:asvg="http://schemas.microsoft.com/office/drawing/2016/SVG/main" r:embed="rId3"/>
+                </a:ext>
+              </a:extLst>
+            </a:blip>
+            <a:stretch>
+              <a:fillRect/>
+            </a:stretch>
+          </p:blipFill>
+          <p:spPr>
+            <a:xfrm rot="10800000">
+              <a:off x="6301740" y="3478346"/>
+              <a:ext cx="2503714" cy="2503714"/>
+            </a:xfrm>
+            <a:prstGeom prst="rect">
+              <a:avLst/>
+            </a:prstGeom>
+          </p:spPr>
+        </p:pic>
+        <p:sp>
+          <p:nvSpPr>
+            <p:cNvPr id="7" name="TextBox 6">
+              <a:extLst>
+                <a:ext uri="{FF2B5EF4-FFF2-40B4-BE49-F238E27FC236}">
+                  <a16:creationId xmlns:a16="http://schemas.microsoft.com/office/drawing/2014/main" id="{EFC20B08-DFDF-27F0-7D41-E07E70FBCD41}"/>
+                </a:ext>
+              </a:extLst>
+            </p:cNvPr>
+            <p:cNvSpPr txBox="1"/>
+            <p:nvPr/>
+          </p:nvSpPr>
+          <p:spPr>
+            <a:xfrm>
+              <a:off x="7090954" y="4092339"/>
+              <a:ext cx="925286" cy="923330"/>
+            </a:xfrm>
+            <a:prstGeom prst="rect">
+              <a:avLst/>
+            </a:prstGeom>
+            <a:noFill/>
+          </p:spPr>
+          <p:txBody>
+            <a:bodyPr wrap="square" rtlCol="0">
+              <a:spAutoFit/>
+            </a:bodyPr>
+            <a:lstStyle/>
+            <a:p>
+              <a:pPr algn="ctr"/>
+              <a:r>
+                <a:rPr lang="fr-CH" dirty="0">
+                  <a:latin typeface="Consolas" panose="020B0609020204030204" pitchFamily="49" charset="0"/>
+                </a:rPr>
+                <a:t>75b9</a:t>
+              </a:r>
+            </a:p>
+            <a:p>
+              <a:pPr algn="ctr"/>
+              <a:r>
+                <a:rPr lang="fr-CH" dirty="0">
+                  <a:latin typeface="Consolas" panose="020B0609020204030204" pitchFamily="49" charset="0"/>
+                </a:rPr>
+                <a:t>…</a:t>
+              </a:r>
+            </a:p>
+            <a:p>
+              <a:pPr algn="ctr"/>
+              <a:r>
+                <a:rPr lang="fr-CH" dirty="0">
+                  <a:latin typeface="Consolas" panose="020B0609020204030204" pitchFamily="49" charset="0"/>
+                </a:rPr>
+                <a:t>2fa0c</a:t>
+              </a:r>
+            </a:p>
+          </p:txBody>
+        </p:sp>
+      </p:grpSp>
+      <p:grpSp>
+        <p:nvGrpSpPr>
+          <p:cNvPr id="11" name="Group 10">
+            <a:extLst>
+              <a:ext uri="{FF2B5EF4-FFF2-40B4-BE49-F238E27FC236}">
+                <a16:creationId xmlns:a16="http://schemas.microsoft.com/office/drawing/2014/main" id="{4B1161D8-4881-301C-3424-575131BA770B}"/>
+              </a:ext>
+            </a:extLst>
+          </p:cNvPr>
+          <p:cNvGrpSpPr/>
+          <p:nvPr/>
+        </p:nvGrpSpPr>
+        <p:grpSpPr>
+          <a:xfrm>
+            <a:off x="2209800" y="3439157"/>
+            <a:ext cx="2582092" cy="2582092"/>
+            <a:chOff x="1245326" y="3429000"/>
+            <a:chExt cx="2582092" cy="2582092"/>
+          </a:xfrm>
+        </p:grpSpPr>
+        <p:pic>
+          <p:nvPicPr>
+            <p:cNvPr id="9" name="Graphic 8" descr="Laptop with solid fill">
+              <a:extLst>
+                <a:ext uri="{FF2B5EF4-FFF2-40B4-BE49-F238E27FC236}">
+                  <a16:creationId xmlns:a16="http://schemas.microsoft.com/office/drawing/2014/main" id="{DD0D62A5-516C-E049-D6C1-BB0720458F86}"/>
+                </a:ext>
+              </a:extLst>
+            </p:cNvPr>
+            <p:cNvPicPr>
+              <a:picLocks noChangeAspect="1"/>
+            </p:cNvPicPr>
+            <p:nvPr/>
+          </p:nvPicPr>
+          <p:blipFill>
+            <a:blip r:embed="rId4">
+              <a:extLst>
+                <a:ext uri="{28A0092B-C50C-407E-A947-70E740481C1C}">
+                  <a14:useLocalDpi xmlns:a14="http://schemas.microsoft.com/office/drawing/2010/main" val="0"/>
+                </a:ext>
+                <a:ext uri="{96DAC541-7B7A-43D3-8B79-37D633B846F1}">
+                  <asvg:svgBlip xmlns:asvg="http://schemas.microsoft.com/office/drawing/2016/SVG/main" r:embed="rId5"/>
+                </a:ext>
+              </a:extLst>
+            </a:blip>
+            <a:stretch>
+              <a:fillRect/>
+            </a:stretch>
+          </p:blipFill>
+          <p:spPr>
+            <a:xfrm>
+              <a:off x="1245326" y="3429000"/>
+              <a:ext cx="2582092" cy="2582092"/>
+            </a:xfrm>
+            <a:prstGeom prst="rect">
+              <a:avLst/>
+            </a:prstGeom>
+          </p:spPr>
+        </p:pic>
+        <p:sp>
+          <p:nvSpPr>
+            <p:cNvPr id="10" name="TextBox 9">
+              <a:extLst>
+                <a:ext uri="{FF2B5EF4-FFF2-40B4-BE49-F238E27FC236}">
+                  <a16:creationId xmlns:a16="http://schemas.microsoft.com/office/drawing/2014/main" id="{8ABA1D79-5433-F051-7560-F3132C9BA2C5}"/>
+                </a:ext>
+              </a:extLst>
+            </p:cNvPr>
+            <p:cNvSpPr txBox="1"/>
+            <p:nvPr/>
+          </p:nvSpPr>
+          <p:spPr>
+            <a:xfrm>
+              <a:off x="1776548" y="4174515"/>
+              <a:ext cx="1502229" cy="369332"/>
+            </a:xfrm>
+            <a:prstGeom prst="rect">
+              <a:avLst/>
+            </a:prstGeom>
+            <a:noFill/>
+          </p:spPr>
+          <p:txBody>
+            <a:bodyPr wrap="square" rtlCol="0">
+              <a:spAutoFit/>
+            </a:bodyPr>
+            <a:lstStyle/>
+            <a:p>
+              <a:pPr algn="ctr"/>
+              <a:r>
+                <a:rPr lang="fr-CH" dirty="0">
+                  <a:latin typeface="Consolas" panose="020B0609020204030204" pitchFamily="49" charset="0"/>
+                </a:rPr>
+                <a:t>75b9…2fa0c</a:t>
+              </a:r>
+              <a:endParaRPr lang="fr-CH" dirty="0"/>
+            </a:p>
+          </p:txBody>
+        </p:sp>
+      </p:grpSp>
+    </p:spTree>
+    <p:extLst>
+      <p:ext uri="{BB962C8B-B14F-4D97-AF65-F5344CB8AC3E}">
+        <p14:creationId xmlns:p14="http://schemas.microsoft.com/office/powerpoint/2010/main" val="1042603272"/>
+      </p:ext>
+    </p:extLst>
+  </p:cSld>
+  <p:clrMapOvr>
+    <a:masterClrMapping/>
+  </p:clrMapOvr>
+</p:sld>
+</file>
+
+<file path=ppt/slides/slide5.xml><?xml version="1.0" encoding="utf-8"?>
+<p:sld xmlns:a="http://schemas.openxmlformats.org/drawingml/2006/main" xmlns:r="http://schemas.openxmlformats.org/officeDocument/2006/relationships" xmlns:p="http://schemas.openxmlformats.org/presentationml/2006/main">
+  <p:cSld>
+    <p:spTree>
+      <p:nvGrpSpPr>
+        <p:cNvPr id="1" name=""/>
+        <p:cNvGrpSpPr/>
+        <p:nvPr/>
+      </p:nvGrpSpPr>
+      <p:grpSpPr>
+        <a:xfrm>
+          <a:off x="0" y="0"/>
+          <a:ext cx="0" cy="0"/>
+          <a:chOff x="0" y="0"/>
+          <a:chExt cx="0" cy="0"/>
+        </a:xfrm>
+      </p:grpSpPr>
+      <p:sp>
+        <p:nvSpPr>
+          <p:cNvPr id="2" name="Title 1">
+            <a:extLst>
+              <a:ext uri="{FF2B5EF4-FFF2-40B4-BE49-F238E27FC236}">
+                <a16:creationId xmlns:a16="http://schemas.microsoft.com/office/drawing/2014/main" id="{A30F7AD8-27FA-175A-6156-79E45257D829}"/>
+              </a:ext>
+            </a:extLst>
+          </p:cNvPr>
+          <p:cNvSpPr>
+            <a:spLocks noGrp="1"/>
+          </p:cNvSpPr>
+          <p:nvPr>
+            <p:ph type="title"/>
+          </p:nvPr>
+        </p:nvSpPr>
+        <p:spPr/>
+        <p:txBody>
+          <a:bodyPr/>
+          <a:lstStyle/>
+          <a:p>
+            <a:r>
+              <a:rPr lang="fr-CH" dirty="0"/>
+              <a:t>Project goal</a:t>
+            </a:r>
+          </a:p>
+        </p:txBody>
+      </p:sp>
+      <p:sp>
+        <p:nvSpPr>
+          <p:cNvPr id="4" name="Date Placeholder 3">
+            <a:extLst>
+              <a:ext uri="{FF2B5EF4-FFF2-40B4-BE49-F238E27FC236}">
+                <a16:creationId xmlns:a16="http://schemas.microsoft.com/office/drawing/2014/main" id="{204D37A6-523F-5266-000F-1DE33FAF2871}"/>
+              </a:ext>
+            </a:extLst>
+          </p:cNvPr>
+          <p:cNvSpPr>
+            <a:spLocks noGrp="1"/>
+          </p:cNvSpPr>
+          <p:nvPr>
+            <p:ph type="dt" sz="half" idx="10"/>
+          </p:nvPr>
+        </p:nvSpPr>
+        <p:spPr/>
+        <p:txBody>
+          <a:bodyPr/>
+          <a:lstStyle/>
+          <a:p>
+            <a:fld id="{D5B883ED-45C8-4197-AC8A-34C53A37604F}" type="datetime1">
+              <a:rPr lang="fr-CH" smtClean="0"/>
+              <a:t>06.05.2022</a:t>
+            </a:fld>
+            <a:endParaRPr lang="fr-CH"/>
+          </a:p>
+        </p:txBody>
+      </p:sp>
+      <p:sp>
+        <p:nvSpPr>
+          <p:cNvPr id="5" name="Slide Number Placeholder 4">
+            <a:extLst>
+              <a:ext uri="{FF2B5EF4-FFF2-40B4-BE49-F238E27FC236}">
+                <a16:creationId xmlns:a16="http://schemas.microsoft.com/office/drawing/2014/main" id="{D50F6797-39D8-02D1-8001-F71E224D3A61}"/>
+              </a:ext>
+            </a:extLst>
+          </p:cNvPr>
+          <p:cNvSpPr>
+            <a:spLocks noGrp="1"/>
+          </p:cNvSpPr>
+          <p:nvPr>
+            <p:ph type="sldNum" sz="quarter" idx="12"/>
+          </p:nvPr>
+        </p:nvSpPr>
+        <p:spPr/>
+        <p:txBody>
+          <a:bodyPr/>
+          <a:lstStyle/>
+          <a:p>
+            <a:fld id="{CD36EB9B-5452-4822-AF0B-FE34A9642046}" type="slidenum">
+              <a:rPr lang="fr-CH" smtClean="0"/>
+              <a:t>5</a:t>
+            </a:fld>
+            <a:endParaRPr lang="fr-CH"/>
+          </a:p>
+        </p:txBody>
+      </p:sp>
+      <p:sp>
+        <p:nvSpPr>
+          <p:cNvPr id="6" name="Content Placeholder 2">
+            <a:extLst>
+              <a:ext uri="{FF2B5EF4-FFF2-40B4-BE49-F238E27FC236}">
+                <a16:creationId xmlns:a16="http://schemas.microsoft.com/office/drawing/2014/main" id="{D432036D-B3B0-F1ED-5FD4-789ED7FFE6B2}"/>
               </a:ext>
             </a:extLst>
           </p:cNvPr>
@@ -5117,8 +6266,8 @@
         </p:nvSpPr>
         <p:spPr>
           <a:xfrm>
-            <a:off x="493644" y="4460045"/>
-            <a:ext cx="10860156" cy="1858669"/>
+            <a:off x="493644" y="1690688"/>
+            <a:ext cx="10860156" cy="1325563"/>
           </a:xfrm>
           <a:prstGeom prst="rect">
             <a:avLst/>
@@ -5126,7 +6275,7 @@
         </p:spPr>
         <p:txBody>
           <a:bodyPr vert="horz" lIns="91440" tIns="45720" rIns="91440" bIns="45720" rtlCol="0">
-            <a:normAutofit/>
+            <a:normAutofit lnSpcReduction="10000"/>
           </a:bodyPr>
           <a:lstStyle>
             <a:lvl1pPr marL="228600" indent="-228600" algn="l" defTabSz="914400" rtl="0" eaLnBrk="1" latinLnBrk="0" hangingPunct="1">
@@ -5299,15 +6448,7 @@
             </a:r>
             <a:r>
               <a:rPr lang="fr-CH" dirty="0"/>
-              <a:t>: digests are </a:t>
-            </a:r>
-            <a:r>
-              <a:rPr lang="fr-CH" dirty="0" err="1"/>
-              <a:t>cumbersome</a:t>
-            </a:r>
-            <a:r>
-              <a:rPr lang="fr-CH" dirty="0"/>
-              <a:t> to compare -&gt; </a:t>
+              <a:t>: </a:t>
             </a:r>
             <a:r>
               <a:rPr lang="fr-CH" dirty="0" err="1"/>
@@ -5345,125 +6486,70 @@
               <a:rPr lang="fr-CH" dirty="0" err="1"/>
               <a:t>bother</a:t>
             </a:r>
+            <a:r>
+              <a:rPr lang="fr-CH" dirty="0"/>
+              <a:t> compare strings</a:t>
+            </a:r>
+          </a:p>
+          <a:p>
+            <a:r>
+              <a:rPr lang="fr-CH" dirty="0"/>
+              <a:t>Solution (?): encode the hash as a </a:t>
+            </a:r>
+            <a:r>
+              <a:rPr lang="fr-CH" dirty="0" err="1"/>
+              <a:t>picture</a:t>
+            </a:r>
+            <a:r>
+              <a:rPr lang="fr-CH" dirty="0"/>
+              <a:t> </a:t>
+            </a:r>
+            <a:r>
+              <a:rPr lang="fr-CH" dirty="0" err="1"/>
+              <a:t>so</a:t>
+            </a:r>
+            <a:r>
+              <a:rPr lang="fr-CH" dirty="0"/>
+              <a:t> </a:t>
+            </a:r>
+            <a:r>
+              <a:rPr lang="fr-CH" dirty="0" err="1"/>
+              <a:t>that</a:t>
+            </a:r>
+            <a:r>
+              <a:rPr lang="fr-CH" dirty="0"/>
+              <a:t> </a:t>
+            </a:r>
+            <a:r>
+              <a:rPr lang="fr-CH" dirty="0" err="1"/>
+              <a:t>differences</a:t>
+            </a:r>
+            <a:r>
+              <a:rPr lang="fr-CH" dirty="0"/>
+              <a:t> </a:t>
+            </a:r>
+            <a:r>
+              <a:rPr lang="fr-CH" dirty="0" err="1"/>
+              <a:t>instantly</a:t>
+            </a:r>
+            <a:r>
+              <a:rPr lang="fr-CH" dirty="0"/>
+              <a:t> pop to the </a:t>
+            </a:r>
+            <a:r>
+              <a:rPr lang="fr-CH" dirty="0" err="1"/>
+              <a:t>eye</a:t>
+            </a:r>
             <a:endParaRPr lang="fr-CH" dirty="0"/>
           </a:p>
-          <a:p>
-            <a:r>
-              <a:rPr lang="fr-CH" dirty="0"/>
-              <a:t>Solution (?): encode the hash as a </a:t>
-            </a:r>
-            <a:r>
-              <a:rPr lang="fr-CH" dirty="0" err="1"/>
-              <a:t>picture</a:t>
-            </a:r>
-            <a:r>
-              <a:rPr lang="fr-CH" dirty="0"/>
-              <a:t> </a:t>
-            </a:r>
-            <a:r>
-              <a:rPr lang="fr-CH" dirty="0" err="1"/>
-              <a:t>so</a:t>
-            </a:r>
-            <a:r>
-              <a:rPr lang="fr-CH" dirty="0"/>
-              <a:t> </a:t>
-            </a:r>
-            <a:r>
-              <a:rPr lang="fr-CH" dirty="0" err="1"/>
-              <a:t>that</a:t>
-            </a:r>
-            <a:r>
-              <a:rPr lang="fr-CH" dirty="0"/>
-              <a:t> </a:t>
-            </a:r>
-            <a:r>
-              <a:rPr lang="fr-CH" dirty="0" err="1"/>
-              <a:t>differences</a:t>
-            </a:r>
-            <a:r>
-              <a:rPr lang="fr-CH" dirty="0"/>
-              <a:t> pop </a:t>
-            </a:r>
-            <a:r>
-              <a:rPr lang="fr-CH" dirty="0" err="1"/>
-              <a:t>instantly</a:t>
-            </a:r>
-            <a:r>
-              <a:rPr lang="fr-CH" dirty="0"/>
-              <a:t> to the </a:t>
-            </a:r>
-            <a:r>
-              <a:rPr lang="fr-CH" dirty="0" err="1"/>
-              <a:t>eye</a:t>
-            </a:r>
-            <a:endParaRPr lang="fr-CH" dirty="0"/>
-          </a:p>
-        </p:txBody>
-      </p:sp>
-      <p:sp>
-        <p:nvSpPr>
-          <p:cNvPr id="5" name="Date Placeholder 4">
-            <a:extLst>
-              <a:ext uri="{FF2B5EF4-FFF2-40B4-BE49-F238E27FC236}">
-                <a16:creationId xmlns:a16="http://schemas.microsoft.com/office/drawing/2014/main" id="{1EA9F5C1-C849-53F7-4FDA-2CD4FDF56463}"/>
-              </a:ext>
-            </a:extLst>
-          </p:cNvPr>
-          <p:cNvSpPr>
-            <a:spLocks noGrp="1"/>
-          </p:cNvSpPr>
-          <p:nvPr>
-            <p:ph type="dt" sz="half" idx="10"/>
-          </p:nvPr>
-        </p:nvSpPr>
-        <p:spPr/>
-        <p:txBody>
-          <a:bodyPr/>
-          <a:lstStyle/>
-          <a:p>
-            <a:fld id="{96D717B7-0F2C-4AE9-80E5-212D14DE2157}" type="datetime1">
-              <a:rPr lang="fr-CH" smtClean="0"/>
-              <a:t>03.05.2022</a:t>
-            </a:fld>
-            <a:endParaRPr lang="fr-CH"/>
-          </a:p>
-        </p:txBody>
-      </p:sp>
-      <p:sp>
-        <p:nvSpPr>
-          <p:cNvPr id="6" name="Slide Number Placeholder 5">
-            <a:extLst>
-              <a:ext uri="{FF2B5EF4-FFF2-40B4-BE49-F238E27FC236}">
-                <a16:creationId xmlns:a16="http://schemas.microsoft.com/office/drawing/2014/main" id="{468D737C-A7B6-998D-330C-8F7908E197D8}"/>
-              </a:ext>
-            </a:extLst>
-          </p:cNvPr>
-          <p:cNvSpPr>
-            <a:spLocks noGrp="1"/>
-          </p:cNvSpPr>
-          <p:nvPr>
-            <p:ph type="sldNum" sz="quarter" idx="12"/>
-          </p:nvPr>
-        </p:nvSpPr>
-        <p:spPr/>
-        <p:txBody>
-          <a:bodyPr/>
-          <a:lstStyle/>
-          <a:p>
-            <a:fld id="{CD36EB9B-5452-4822-AF0B-FE34A9642046}" type="slidenum">
-              <a:rPr lang="fr-CH" smtClean="0"/>
-              <a:t>4</a:t>
-            </a:fld>
-            <a:endParaRPr lang="fr-CH"/>
-          </a:p>
-        </p:txBody>
-      </p:sp>
-      <p:sp>
-        <p:nvSpPr>
-          <p:cNvPr id="7" name="TextBox 6">
-            <a:extLst>
-              <a:ext uri="{FF2B5EF4-FFF2-40B4-BE49-F238E27FC236}">
-                <a16:creationId xmlns:a16="http://schemas.microsoft.com/office/drawing/2014/main" id="{EFC20B08-DFDF-27F0-7D41-E07E70FBCD41}"/>
+        </p:txBody>
+      </p:sp>
+      <p:sp>
+        <p:nvSpPr>
+          <p:cNvPr id="9" name="TextBox 8">
+            <a:extLst>
+              <a:ext uri="{FF2B5EF4-FFF2-40B4-BE49-F238E27FC236}">
+                <a16:creationId xmlns:a16="http://schemas.microsoft.com/office/drawing/2014/main" id="{0597BD39-D45C-092A-6B52-6D0039C2783D}"/>
               </a:ext>
             </a:extLst>
           </p:cNvPr>
@@ -5472,7 +6558,7 @@
         </p:nvSpPr>
         <p:spPr>
           <a:xfrm>
-            <a:off x="3028927" y="3429000"/>
+            <a:off x="513779" y="4039969"/>
             <a:ext cx="5789589" cy="646331"/>
           </a:xfrm>
           <a:prstGeom prst="rect">
@@ -5490,7 +6576,7 @@
               <a:rPr lang="fr-CH" dirty="0">
                 <a:latin typeface="Consolas" panose="020B0609020204030204" pitchFamily="49" charset="0"/>
               </a:rPr>
-              <a:t>h1 = 75b9bce343839d7faa6c3e0c9152fa0c</a:t>
+              <a:t>75b9bce343839d7faa6c3e0c9152fa0c</a:t>
             </a:r>
           </a:p>
           <a:p>
@@ -5498,156 +6584,124 @@
               <a:rPr lang="fr-CH" dirty="0">
                 <a:latin typeface="Consolas" panose="020B0609020204030204" pitchFamily="49" charset="0"/>
               </a:rPr>
-              <a:t>	h2 = 75b9bce34383957faa6c3e0c9152fa0c</a:t>
-            </a:r>
-          </a:p>
-        </p:txBody>
-      </p:sp>
-    </p:spTree>
-    <p:extLst>
-      <p:ext uri="{BB962C8B-B14F-4D97-AF65-F5344CB8AC3E}">
-        <p14:creationId xmlns:p14="http://schemas.microsoft.com/office/powerpoint/2010/main" val="1042603272"/>
-      </p:ext>
-    </p:extLst>
-  </p:cSld>
-  <p:clrMapOvr>
-    <a:masterClrMapping/>
-  </p:clrMapOvr>
-</p:sld>
-</file>
-
-<file path=ppt/slides/slide5.xml><?xml version="1.0" encoding="utf-8"?>
-<p:sld xmlns:a="http://schemas.openxmlformats.org/drawingml/2006/main" xmlns:r="http://schemas.openxmlformats.org/officeDocument/2006/relationships" xmlns:p="http://schemas.openxmlformats.org/presentationml/2006/main">
-  <p:cSld>
-    <p:spTree>
-      <p:nvGrpSpPr>
-        <p:cNvPr id="1" name=""/>
-        <p:cNvGrpSpPr/>
-        <p:nvPr/>
-      </p:nvGrpSpPr>
-      <p:grpSpPr>
-        <a:xfrm>
-          <a:off x="0" y="0"/>
-          <a:ext cx="0" cy="0"/>
-          <a:chOff x="0" y="0"/>
-          <a:chExt cx="0" cy="0"/>
-        </a:xfrm>
-      </p:grpSpPr>
-      <p:sp>
-        <p:nvSpPr>
-          <p:cNvPr id="2" name="Title 1">
-            <a:extLst>
-              <a:ext uri="{FF2B5EF4-FFF2-40B4-BE49-F238E27FC236}">
-                <a16:creationId xmlns:a16="http://schemas.microsoft.com/office/drawing/2014/main" id="{A30F7AD8-27FA-175A-6156-79E45257D829}"/>
-              </a:ext>
-            </a:extLst>
-          </p:cNvPr>
-          <p:cNvSpPr>
-            <a:spLocks noGrp="1"/>
-          </p:cNvSpPr>
-          <p:nvPr>
-            <p:ph type="title"/>
-          </p:nvPr>
-        </p:nvSpPr>
-        <p:spPr/>
-        <p:txBody>
-          <a:bodyPr/>
-          <a:lstStyle/>
-          <a:p>
-            <a:r>
-              <a:rPr lang="fr-CH" dirty="0"/>
-              <a:t>Project goal</a:t>
-            </a:r>
-          </a:p>
-        </p:txBody>
-      </p:sp>
-      <p:sp>
-        <p:nvSpPr>
-          <p:cNvPr id="3" name="Content Placeholder 2">
-            <a:extLst>
-              <a:ext uri="{FF2B5EF4-FFF2-40B4-BE49-F238E27FC236}">
-                <a16:creationId xmlns:a16="http://schemas.microsoft.com/office/drawing/2014/main" id="{515B45E1-A58F-2A8D-B943-9237B6757A8F}"/>
-              </a:ext>
-            </a:extLst>
-          </p:cNvPr>
-          <p:cNvSpPr>
-            <a:spLocks noGrp="1"/>
-          </p:cNvSpPr>
-          <p:nvPr>
-            <p:ph idx="1"/>
-          </p:nvPr>
-        </p:nvSpPr>
-        <p:spPr/>
-        <p:txBody>
-          <a:bodyPr/>
-          <a:lstStyle/>
-          <a:p>
-            <a:r>
-              <a:rPr lang="fr-CH" dirty="0" err="1"/>
-              <a:t>Schema</a:t>
-            </a:r>
-            <a:r>
-              <a:rPr lang="fr-CH" dirty="0"/>
-              <a:t> ?</a:t>
-            </a:r>
-          </a:p>
-        </p:txBody>
-      </p:sp>
-      <p:sp>
-        <p:nvSpPr>
-          <p:cNvPr id="4" name="Date Placeholder 3">
-            <a:extLst>
-              <a:ext uri="{FF2B5EF4-FFF2-40B4-BE49-F238E27FC236}">
-                <a16:creationId xmlns:a16="http://schemas.microsoft.com/office/drawing/2014/main" id="{204D37A6-523F-5266-000F-1DE33FAF2871}"/>
-              </a:ext>
-            </a:extLst>
-          </p:cNvPr>
-          <p:cNvSpPr>
-            <a:spLocks noGrp="1"/>
-          </p:cNvSpPr>
-          <p:nvPr>
-            <p:ph type="dt" sz="half" idx="10"/>
-          </p:nvPr>
-        </p:nvSpPr>
-        <p:spPr/>
-        <p:txBody>
-          <a:bodyPr/>
-          <a:lstStyle/>
-          <a:p>
-            <a:fld id="{D5B883ED-45C8-4197-AC8A-34C53A37604F}" type="datetime1">
-              <a:rPr lang="fr-CH" smtClean="0"/>
-              <a:t>03.05.2022</a:t>
-            </a:fld>
-            <a:endParaRPr lang="fr-CH"/>
-          </a:p>
-        </p:txBody>
-      </p:sp>
-      <p:sp>
-        <p:nvSpPr>
-          <p:cNvPr id="5" name="Slide Number Placeholder 4">
-            <a:extLst>
-              <a:ext uri="{FF2B5EF4-FFF2-40B4-BE49-F238E27FC236}">
-                <a16:creationId xmlns:a16="http://schemas.microsoft.com/office/drawing/2014/main" id="{D50F6797-39D8-02D1-8001-F71E224D3A61}"/>
-              </a:ext>
-            </a:extLst>
-          </p:cNvPr>
-          <p:cNvSpPr>
-            <a:spLocks noGrp="1"/>
-          </p:cNvSpPr>
-          <p:nvPr>
-            <p:ph type="sldNum" sz="quarter" idx="12"/>
-          </p:nvPr>
-        </p:nvSpPr>
-        <p:spPr/>
-        <p:txBody>
-          <a:bodyPr/>
-          <a:lstStyle/>
-          <a:p>
-            <a:fld id="{CD36EB9B-5452-4822-AF0B-FE34A9642046}" type="slidenum">
-              <a:rPr lang="fr-CH" smtClean="0"/>
-              <a:t>5</a:t>
-            </a:fld>
-            <a:endParaRPr lang="fr-CH"/>
+              <a:t>	75b9bce34383957faa6c3e0c9152fa0c</a:t>
+            </a:r>
+          </a:p>
+        </p:txBody>
+      </p:sp>
+      <p:pic>
+        <p:nvPicPr>
+          <p:cNvPr id="11" name="Picture 10" descr="Background pattern&#10;&#10;Description automatically generated">
+            <a:extLst>
+              <a:ext uri="{FF2B5EF4-FFF2-40B4-BE49-F238E27FC236}">
+                <a16:creationId xmlns:a16="http://schemas.microsoft.com/office/drawing/2014/main" id="{34B3C015-5F9B-B379-0837-67D235E7CC18}"/>
+              </a:ext>
+            </a:extLst>
+          </p:cNvPr>
+          <p:cNvPicPr>
+            <a:picLocks noChangeAspect="1"/>
+          </p:cNvPicPr>
+          <p:nvPr/>
+        </p:nvPicPr>
+        <p:blipFill>
+          <a:blip r:embed="rId2">
+            <a:extLst>
+              <a:ext uri="{28A0092B-C50C-407E-A947-70E740481C1C}">
+                <a14:useLocalDpi xmlns:a14="http://schemas.microsoft.com/office/drawing/2010/main" val="0"/>
+              </a:ext>
+            </a:extLst>
+          </a:blip>
+          <a:stretch>
+            <a:fillRect/>
+          </a:stretch>
+        </p:blipFill>
+        <p:spPr>
+          <a:xfrm>
+            <a:off x="7391400" y="2991985"/>
+            <a:ext cx="2438400" cy="2438400"/>
+          </a:xfrm>
+          <a:prstGeom prst="rect">
+            <a:avLst/>
+          </a:prstGeom>
+        </p:spPr>
+      </p:pic>
+      <p:pic>
+        <p:nvPicPr>
+          <p:cNvPr id="13" name="Picture 12" descr="Background pattern&#10;&#10;Description automatically generated">
+            <a:extLst>
+              <a:ext uri="{FF2B5EF4-FFF2-40B4-BE49-F238E27FC236}">
+                <a16:creationId xmlns:a16="http://schemas.microsoft.com/office/drawing/2014/main" id="{9E9E9616-3A4A-09F8-4989-4A28A740888E}"/>
+              </a:ext>
+            </a:extLst>
+          </p:cNvPr>
+          <p:cNvPicPr>
+            <a:picLocks noChangeAspect="1"/>
+          </p:cNvPicPr>
+          <p:nvPr/>
+        </p:nvPicPr>
+        <p:blipFill>
+          <a:blip r:embed="rId3">
+            <a:extLst>
+              <a:ext uri="{28A0092B-C50C-407E-A947-70E740481C1C}">
+                <a14:useLocalDpi xmlns:a14="http://schemas.microsoft.com/office/drawing/2010/main" val="0"/>
+              </a:ext>
+            </a:extLst>
+          </a:blip>
+          <a:stretch>
+            <a:fillRect/>
+          </a:stretch>
+        </p:blipFill>
+        <p:spPr>
+          <a:xfrm>
+            <a:off x="8983113" y="3811587"/>
+            <a:ext cx="2438400" cy="2438400"/>
+          </a:xfrm>
+          <a:prstGeom prst="rect">
+            <a:avLst/>
+          </a:prstGeom>
+        </p:spPr>
+      </p:pic>
+      <p:sp>
+        <p:nvSpPr>
+          <p:cNvPr id="15" name="Arrow: Right 14">
+            <a:extLst>
+              <a:ext uri="{FF2B5EF4-FFF2-40B4-BE49-F238E27FC236}">
+                <a16:creationId xmlns:a16="http://schemas.microsoft.com/office/drawing/2014/main" id="{795000FC-FB5C-792E-1C7D-8AF41DC13826}"/>
+              </a:ext>
+            </a:extLst>
+          </p:cNvPr>
+          <p:cNvSpPr/>
+          <p:nvPr/>
+        </p:nvSpPr>
+        <p:spPr>
+          <a:xfrm>
+            <a:off x="5791999" y="4089561"/>
+            <a:ext cx="1123406" cy="504506"/>
+          </a:xfrm>
+          <a:prstGeom prst="rightArrow">
+            <a:avLst/>
+          </a:prstGeom>
+        </p:spPr>
+        <p:style>
+          <a:lnRef idx="1">
+            <a:schemeClr val="accent2"/>
+          </a:lnRef>
+          <a:fillRef idx="2">
+            <a:schemeClr val="accent2"/>
+          </a:fillRef>
+          <a:effectRef idx="1">
+            <a:schemeClr val="accent2"/>
+          </a:effectRef>
+          <a:fontRef idx="minor">
+            <a:schemeClr val="dk1"/>
+          </a:fontRef>
+        </p:style>
+        <p:txBody>
+          <a:bodyPr rtlCol="0" anchor="ctr"/>
+          <a:lstStyle/>
+          <a:p>
+            <a:pPr algn="ctr"/>
+            <a:endParaRPr lang="fr-CH" dirty="0"/>
           </a:p>
         </p:txBody>
       </p:sp>
@@ -5686,7 +6740,7 @@
           <p:cNvPr id="2" name="Title 1">
             <a:extLst>
               <a:ext uri="{FF2B5EF4-FFF2-40B4-BE49-F238E27FC236}">
-                <a16:creationId xmlns:a16="http://schemas.microsoft.com/office/drawing/2014/main" id="{99F95439-6EBE-0118-1890-70FF73DA01DD}"/>
+                <a16:creationId xmlns:a16="http://schemas.microsoft.com/office/drawing/2014/main" id="{9D6F901D-4D57-AF07-A149-9A8AD3F3EDBD}"/>
               </a:ext>
             </a:extLst>
           </p:cNvPr>
@@ -5704,7 +6758,7 @@
           <a:p>
             <a:r>
               <a:rPr lang="fr-CH" dirty="0" err="1"/>
-              <a:t>Existing</a:t>
+              <a:t>What</a:t>
             </a:r>
             <a:r>
               <a:rPr lang="fr-CH" dirty="0"/>
@@ -5712,7 +6766,23 @@
             </a:r>
             <a:r>
               <a:rPr lang="fr-CH" dirty="0" err="1"/>
-              <a:t>schemes</a:t>
+              <a:t>we</a:t>
+            </a:r>
+            <a:r>
+              <a:rPr lang="fr-CH" dirty="0"/>
+              <a:t> </a:t>
+            </a:r>
+            <a:r>
+              <a:rPr lang="fr-CH" dirty="0" err="1"/>
+              <a:t>want</a:t>
+            </a:r>
+            <a:r>
+              <a:rPr lang="fr-CH" dirty="0"/>
+              <a:t> to </a:t>
+            </a:r>
+            <a:r>
+              <a:rPr lang="fr-CH" dirty="0" err="1"/>
+              <a:t>avoid</a:t>
             </a:r>
             <a:endParaRPr lang="fr-CH" dirty="0"/>
           </a:p>
@@ -5723,7 +6793,7 @@
           <p:cNvPr id="3" name="Content Placeholder 2">
             <a:extLst>
               <a:ext uri="{FF2B5EF4-FFF2-40B4-BE49-F238E27FC236}">
-                <a16:creationId xmlns:a16="http://schemas.microsoft.com/office/drawing/2014/main" id="{679F3403-5921-2567-441F-510EDE1E299B}"/>
+                <a16:creationId xmlns:a16="http://schemas.microsoft.com/office/drawing/2014/main" id="{243BC231-5530-AC70-CD78-239828CEE5D0}"/>
               </a:ext>
             </a:extLst>
           </p:cNvPr>
@@ -5741,7 +6811,7 @@
           <a:p>
             <a:r>
               <a:rPr lang="fr-CH" dirty="0" err="1"/>
-              <a:t>Determistic</a:t>
+              <a:t>Different</a:t>
             </a:r>
             <a:r>
               <a:rPr lang="fr-CH" dirty="0"/>
@@ -5749,56 +6819,12 @@
             </a:r>
             <a:r>
               <a:rPr lang="fr-CH" dirty="0" err="1"/>
-              <a:t>schemes</a:t>
-            </a:r>
-            <a:r>
-              <a:rPr lang="fr-CH" dirty="0"/>
-              <a:t> are </a:t>
-            </a:r>
-            <a:r>
-              <a:rPr lang="fr-CH" dirty="0" err="1"/>
-              <a:t>often</a:t>
-            </a:r>
-            <a:r>
-              <a:rPr lang="fr-CH" dirty="0"/>
-              <a:t> not diverse </a:t>
-            </a:r>
-            <a:r>
-              <a:rPr lang="fr-CH" dirty="0" err="1"/>
-              <a:t>enough</a:t>
-            </a:r>
-            <a:endParaRPr lang="fr-CH" dirty="0"/>
-          </a:p>
-          <a:p>
-            <a:r>
-              <a:rPr lang="fr-CH" dirty="0" err="1"/>
-              <a:t>Random</a:t>
-            </a:r>
-            <a:r>
-              <a:rPr lang="fr-CH" dirty="0"/>
-              <a:t> </a:t>
-            </a:r>
-            <a:r>
-              <a:rPr lang="fr-CH" dirty="0" err="1"/>
-              <a:t>schemes</a:t>
-            </a:r>
-            <a:r>
-              <a:rPr lang="fr-CH" dirty="0"/>
-              <a:t> </a:t>
-            </a:r>
-            <a:r>
-              <a:rPr lang="fr-CH" dirty="0" err="1"/>
-              <a:t>offer</a:t>
-            </a:r>
-            <a:r>
-              <a:rPr lang="fr-CH" dirty="0"/>
-              <a:t> no </a:t>
-            </a:r>
-            <a:r>
-              <a:rPr lang="fr-CH" dirty="0" err="1"/>
-              <a:t>guarantees</a:t>
-            </a:r>
-            <a:endParaRPr lang="fr-CH" dirty="0"/>
+              <a:t>hashes</a:t>
+            </a:r>
+            <a:r>
+              <a:rPr lang="fr-CH" dirty="0"/>
+              <a:t> -&gt; close images</a:t>
+            </a:r>
           </a:p>
         </p:txBody>
       </p:sp>
@@ -5807,7 +6833,7 @@
           <p:cNvPr id="4" name="Date Placeholder 3">
             <a:extLst>
               <a:ext uri="{FF2B5EF4-FFF2-40B4-BE49-F238E27FC236}">
-                <a16:creationId xmlns:a16="http://schemas.microsoft.com/office/drawing/2014/main" id="{1177A741-E67E-B834-ECD2-9FFE367A194E}"/>
+                <a16:creationId xmlns:a16="http://schemas.microsoft.com/office/drawing/2014/main" id="{FD63AF44-CECD-F8C2-54F2-E28E58308A9C}"/>
               </a:ext>
             </a:extLst>
           </p:cNvPr>
@@ -5823,9 +6849,9 @@
           <a:bodyPr/>
           <a:lstStyle/>
           <a:p>
-            <a:fld id="{2C542BED-3802-4E63-841D-2D8A76B661A0}" type="datetime1">
+            <a:fld id="{D575AF35-2CEB-45E2-9DE9-A54F7EF8A4E1}" type="datetime1">
               <a:rPr lang="fr-CH" smtClean="0"/>
-              <a:t>03.05.2022</a:t>
+              <a:t>06.05.2022</a:t>
             </a:fld>
             <a:endParaRPr lang="fr-CH"/>
           </a:p>
@@ -5836,7 +6862,7 @@
           <p:cNvPr id="5" name="Slide Number Placeholder 4">
             <a:extLst>
               <a:ext uri="{FF2B5EF4-FFF2-40B4-BE49-F238E27FC236}">
-                <a16:creationId xmlns:a16="http://schemas.microsoft.com/office/drawing/2014/main" id="{898625CE-5AED-2739-6C03-723EFC4ED252}"/>
+                <a16:creationId xmlns:a16="http://schemas.microsoft.com/office/drawing/2014/main" id="{9ED0F202-6CE7-FF0F-9CF6-E3142D81C22A}"/>
               </a:ext>
             </a:extLst>
           </p:cNvPr>
@@ -5863,7 +6889,7 @@
     </p:spTree>
     <p:extLst>
       <p:ext uri="{BB962C8B-B14F-4D97-AF65-F5344CB8AC3E}">
-        <p14:creationId xmlns:p14="http://schemas.microsoft.com/office/powerpoint/2010/main" val="1427386466"/>
+        <p14:creationId xmlns:p14="http://schemas.microsoft.com/office/powerpoint/2010/main" val="3223532310"/>
       </p:ext>
     </p:extLst>
   </p:cSld>
@@ -5895,7 +6921,7 @@
           <p:cNvPr id="2" name="Title 1">
             <a:extLst>
               <a:ext uri="{FF2B5EF4-FFF2-40B4-BE49-F238E27FC236}">
-                <a16:creationId xmlns:a16="http://schemas.microsoft.com/office/drawing/2014/main" id="{33974009-B5C4-4D53-26B7-DEEF6B76C69E}"/>
+                <a16:creationId xmlns:a16="http://schemas.microsoft.com/office/drawing/2014/main" id="{7BFCB6D3-5432-82EA-11CF-437EA272B612}"/>
               </a:ext>
             </a:extLst>
           </p:cNvPr>
@@ -5912,227 +6938,119 @@
           <a:lstStyle/>
           <a:p>
             <a:r>
-              <a:rPr lang="fr-CH" dirty="0"/>
-              <a:t>A </a:t>
-            </a:r>
-            <a:r>
-              <a:rPr lang="fr-CH" dirty="0" err="1"/>
-              <a:t>word</a:t>
-            </a:r>
-            <a:r>
-              <a:rPr lang="fr-CH" dirty="0"/>
-              <a:t> about Fourier </a:t>
-            </a:r>
-            <a:r>
-              <a:rPr lang="fr-CH" dirty="0" err="1"/>
-              <a:t>transforms</a:t>
+              <a:rPr lang="fr-CH" dirty="0" err="1"/>
+              <a:t>Existing</a:t>
+            </a:r>
+            <a:r>
+              <a:rPr lang="fr-CH" dirty="0"/>
+              <a:t> </a:t>
+            </a:r>
+            <a:r>
+              <a:rPr lang="fr-CH" dirty="0" err="1"/>
+              <a:t>schemes</a:t>
+            </a:r>
+            <a:r>
+              <a:rPr lang="fr-CH" dirty="0"/>
+              <a:t> – </a:t>
+            </a:r>
+            <a:r>
+              <a:rPr lang="fr-CH" dirty="0" err="1"/>
+              <a:t>Deterministic</a:t>
+            </a:r>
+            <a:r>
+              <a:rPr lang="fr-CH" dirty="0"/>
+              <a:t> </a:t>
+            </a:r>
+          </a:p>
+        </p:txBody>
+      </p:sp>
+      <p:sp>
+        <p:nvSpPr>
+          <p:cNvPr id="3" name="Content Placeholder 2">
+            <a:extLst>
+              <a:ext uri="{FF2B5EF4-FFF2-40B4-BE49-F238E27FC236}">
+                <a16:creationId xmlns:a16="http://schemas.microsoft.com/office/drawing/2014/main" id="{4A85790E-37C0-68B4-7FA4-95127F64B947}"/>
+              </a:ext>
+            </a:extLst>
+          </p:cNvPr>
+          <p:cNvSpPr>
+            <a:spLocks noGrp="1"/>
+          </p:cNvSpPr>
+          <p:nvPr>
+            <p:ph idx="1"/>
+          </p:nvPr>
+        </p:nvSpPr>
+        <p:spPr/>
+        <p:txBody>
+          <a:bodyPr/>
+          <a:lstStyle/>
+          <a:p>
+            <a:pPr marL="0" indent="0">
+              <a:buNone/>
+            </a:pPr>
+            <a:r>
+              <a:rPr lang="fr-CH" dirty="0" err="1"/>
+              <a:t>Map</a:t>
+            </a:r>
+            <a:r>
+              <a:rPr lang="fr-CH" dirty="0"/>
+              <a:t> bits (or groups of bits) to pixels, </a:t>
+            </a:r>
+            <a:r>
+              <a:rPr lang="fr-CH" dirty="0" err="1"/>
+              <a:t>shapes</a:t>
+            </a:r>
+            <a:r>
+              <a:rPr lang="fr-CH" dirty="0"/>
+              <a:t> and </a:t>
+            </a:r>
+            <a:r>
+              <a:rPr lang="fr-CH" dirty="0" err="1"/>
+              <a:t>colors</a:t>
             </a:r>
             <a:endParaRPr lang="fr-CH" dirty="0"/>
           </a:p>
-        </p:txBody>
-      </p:sp>
-      <p:sp>
-        <p:nvSpPr>
-          <p:cNvPr id="3" name="Content Placeholder 2">
-            <a:extLst>
-              <a:ext uri="{FF2B5EF4-FFF2-40B4-BE49-F238E27FC236}">
-                <a16:creationId xmlns:a16="http://schemas.microsoft.com/office/drawing/2014/main" id="{1AA72E63-9118-25BB-8687-A5CD59F80067}"/>
-              </a:ext>
-            </a:extLst>
-          </p:cNvPr>
-          <p:cNvSpPr>
-            <a:spLocks noGrp="1"/>
-          </p:cNvSpPr>
-          <p:nvPr>
-            <p:ph idx="1"/>
-          </p:nvPr>
-        </p:nvSpPr>
-        <p:spPr/>
-        <p:txBody>
-          <a:bodyPr/>
-          <a:lstStyle/>
-          <a:p>
-            <a:r>
-              <a:rPr lang="fr-CH" dirty="0"/>
-              <a:t>Fourier </a:t>
-            </a:r>
-            <a:r>
-              <a:rPr lang="fr-CH" dirty="0" err="1"/>
-              <a:t>transform</a:t>
-            </a:r>
-            <a:r>
-              <a:rPr lang="fr-CH" dirty="0"/>
-              <a:t> </a:t>
-            </a:r>
-            <a:r>
-              <a:rPr lang="fr-CH" dirty="0" err="1"/>
-              <a:t>maps</a:t>
-            </a:r>
-            <a:r>
-              <a:rPr lang="fr-CH" dirty="0"/>
-              <a:t> </a:t>
-            </a:r>
-            <a:r>
-              <a:rPr lang="fr-CH" dirty="0" err="1"/>
-              <a:t>functions</a:t>
-            </a:r>
-            <a:r>
-              <a:rPr lang="fr-CH" dirty="0"/>
-              <a:t> to </a:t>
-            </a:r>
-            <a:r>
-              <a:rPr lang="fr-CH" dirty="0" err="1"/>
-              <a:t>frequences</a:t>
-            </a:r>
-            <a:r>
-              <a:rPr lang="fr-CH" dirty="0"/>
-              <a:t>, and </a:t>
-            </a:r>
-            <a:r>
-              <a:rPr lang="fr-CH" dirty="0" err="1"/>
-              <a:t>its</a:t>
-            </a:r>
-            <a:r>
-              <a:rPr lang="fr-CH" dirty="0"/>
-              <a:t> inverse </a:t>
-            </a:r>
-            <a:r>
-              <a:rPr lang="fr-CH" dirty="0" err="1"/>
-              <a:t>maps</a:t>
-            </a:r>
-            <a:r>
-              <a:rPr lang="fr-CH" dirty="0"/>
-              <a:t> </a:t>
-            </a:r>
-            <a:r>
-              <a:rPr lang="fr-CH" dirty="0" err="1"/>
-              <a:t>frequences</a:t>
-            </a:r>
-            <a:r>
-              <a:rPr lang="fr-CH" dirty="0"/>
-              <a:t> back to a (unique) </a:t>
-            </a:r>
-            <a:r>
-              <a:rPr lang="fr-CH" dirty="0" err="1"/>
-              <a:t>function</a:t>
-            </a:r>
-            <a:r>
-              <a:rPr lang="fr-CH" dirty="0"/>
-              <a:t>.</a:t>
-            </a:r>
-          </a:p>
-          <a:p>
-            <a:r>
-              <a:rPr lang="fr-CH" dirty="0"/>
-              <a:t>A </a:t>
-            </a:r>
-            <a:r>
-              <a:rPr lang="fr-CH" dirty="0" err="1"/>
-              <a:t>picture</a:t>
-            </a:r>
-            <a:r>
-              <a:rPr lang="fr-CH" dirty="0"/>
-              <a:t> can </a:t>
-            </a:r>
-            <a:r>
-              <a:rPr lang="fr-CH" dirty="0" err="1"/>
-              <a:t>be</a:t>
-            </a:r>
-            <a:r>
-              <a:rPr lang="fr-CH" dirty="0"/>
-              <a:t> </a:t>
-            </a:r>
-            <a:r>
-              <a:rPr lang="fr-CH" dirty="0" err="1"/>
-              <a:t>considered</a:t>
-            </a:r>
-            <a:r>
-              <a:rPr lang="fr-CH" dirty="0"/>
-              <a:t> a 2D </a:t>
-            </a:r>
-            <a:r>
-              <a:rPr lang="fr-CH" dirty="0" err="1"/>
-              <a:t>function</a:t>
-            </a:r>
-            <a:r>
-              <a:rPr lang="fr-CH" dirty="0"/>
-              <a:t>.</a:t>
-            </a:r>
-          </a:p>
-          <a:p>
-            <a:r>
-              <a:rPr lang="fr-CH" dirty="0"/>
-              <a:t>Pictures </a:t>
-            </a:r>
-            <a:r>
-              <a:rPr lang="fr-CH" dirty="0" err="1"/>
-              <a:t>with</a:t>
-            </a:r>
-            <a:r>
-              <a:rPr lang="fr-CH" dirty="0"/>
-              <a:t> </a:t>
-            </a:r>
-            <a:r>
-              <a:rPr lang="fr-CH" dirty="0" err="1"/>
-              <a:t>spectra</a:t>
-            </a:r>
-            <a:r>
-              <a:rPr lang="fr-CH" dirty="0"/>
-              <a:t> </a:t>
-            </a:r>
-            <a:r>
-              <a:rPr lang="fr-CH" dirty="0" err="1"/>
-              <a:t>concentrated</a:t>
-            </a:r>
-            <a:r>
-              <a:rPr lang="fr-CH" dirty="0"/>
-              <a:t> </a:t>
-            </a:r>
-            <a:r>
-              <a:rPr lang="fr-CH" dirty="0" err="1"/>
-              <a:t>around</a:t>
-            </a:r>
-            <a:r>
-              <a:rPr lang="fr-CH" dirty="0"/>
-              <a:t> the axes are </a:t>
-            </a:r>
-            <a:r>
-              <a:rPr lang="fr-CH" dirty="0" err="1"/>
-              <a:t>less</a:t>
-            </a:r>
-            <a:r>
-              <a:rPr lang="fr-CH" dirty="0"/>
-              <a:t> </a:t>
-            </a:r>
-            <a:r>
-              <a:rPr lang="fr-CH" dirty="0" err="1"/>
-              <a:t>noisy</a:t>
-            </a:r>
-            <a:r>
-              <a:rPr lang="fr-CH" dirty="0"/>
-              <a:t>, </a:t>
-            </a:r>
-            <a:r>
-              <a:rPr lang="fr-CH" dirty="0" err="1"/>
-              <a:t>thus</a:t>
-            </a:r>
-            <a:r>
-              <a:rPr lang="fr-CH" dirty="0"/>
-              <a:t> </a:t>
-            </a:r>
-            <a:r>
-              <a:rPr lang="fr-CH" dirty="0" err="1"/>
-              <a:t>easier</a:t>
-            </a:r>
-            <a:r>
-              <a:rPr lang="fr-CH" dirty="0"/>
-              <a:t> to process for </a:t>
-            </a:r>
-            <a:r>
-              <a:rPr lang="fr-CH" dirty="0" err="1"/>
-              <a:t>humans</a:t>
-            </a:r>
-            <a:endParaRPr lang="fr-CH" dirty="0"/>
+          <a:p>
+            <a:r>
+              <a:rPr lang="fr-CH" dirty="0" err="1"/>
+              <a:t>Problem</a:t>
+            </a:r>
+            <a:r>
+              <a:rPr lang="fr-CH" dirty="0"/>
+              <a:t>: 256 (or </a:t>
+            </a:r>
+            <a:r>
+              <a:rPr lang="fr-CH" dirty="0" err="1"/>
+              <a:t>even</a:t>
+            </a:r>
+            <a:r>
+              <a:rPr lang="fr-CH" dirty="0"/>
+              <a:t> 128) bits </a:t>
+            </a:r>
+            <a:r>
+              <a:rPr lang="fr-CH" dirty="0" err="1"/>
+              <a:t>is</a:t>
+            </a:r>
+            <a:r>
+              <a:rPr lang="fr-CH" dirty="0"/>
+              <a:t> A LOT of information (</a:t>
+            </a:r>
+            <a:r>
+              <a:rPr lang="fr-CH" dirty="0" err="1"/>
+              <a:t>remainder</a:t>
+            </a:r>
+            <a:r>
+              <a:rPr lang="fr-CH" dirty="0"/>
+              <a:t> : </a:t>
+            </a:r>
+            <a:r>
+              <a:rPr lang="fr-CH" dirty="0" err="1"/>
+              <a:t>comparison</a:t>
+            </a:r>
+            <a:r>
+              <a:rPr lang="fr-CH" dirty="0"/>
+              <a:t>)</a:t>
+            </a:r>
           </a:p>
         </p:txBody>
       </p:sp>
@@ -6141,7 +7059,7 @@
           <p:cNvPr id="4" name="Date Placeholder 3">
             <a:extLst>
               <a:ext uri="{FF2B5EF4-FFF2-40B4-BE49-F238E27FC236}">
-                <a16:creationId xmlns:a16="http://schemas.microsoft.com/office/drawing/2014/main" id="{8F365A24-E7AF-7817-ED8B-7579556BEE7C}"/>
+                <a16:creationId xmlns:a16="http://schemas.microsoft.com/office/drawing/2014/main" id="{CF71F05A-87D4-3D85-A950-8C25D622B547}"/>
               </a:ext>
             </a:extLst>
           </p:cNvPr>
@@ -6157,9 +7075,9 @@
           <a:bodyPr/>
           <a:lstStyle/>
           <a:p>
-            <a:fld id="{16BA1B30-54E2-487D-8FF5-99ED132E9819}" type="datetime1">
+            <a:fld id="{D575AF35-2CEB-45E2-9DE9-A54F7EF8A4E1}" type="datetime1">
               <a:rPr lang="fr-CH" smtClean="0"/>
-              <a:t>03.05.2022</a:t>
+              <a:t>06.05.2022</a:t>
             </a:fld>
             <a:endParaRPr lang="fr-CH"/>
           </a:p>
@@ -6170,7 +7088,7 @@
           <p:cNvPr id="5" name="Slide Number Placeholder 4">
             <a:extLst>
               <a:ext uri="{FF2B5EF4-FFF2-40B4-BE49-F238E27FC236}">
-                <a16:creationId xmlns:a16="http://schemas.microsoft.com/office/drawing/2014/main" id="{42B40409-16D4-FD7E-69FA-84588152F1B4}"/>
+                <a16:creationId xmlns:a16="http://schemas.microsoft.com/office/drawing/2014/main" id="{45CB51B9-A5D8-F396-08D6-4EF08802BF6F}"/>
               </a:ext>
             </a:extLst>
           </p:cNvPr>
@@ -6194,10 +7112,258 @@
           </a:p>
         </p:txBody>
       </p:sp>
+      <p:pic>
+        <p:nvPicPr>
+          <p:cNvPr id="7" name="Picture 6" descr="Qr code&#10;&#10;Description automatically generated">
+            <a:extLst>
+              <a:ext uri="{FF2B5EF4-FFF2-40B4-BE49-F238E27FC236}">
+                <a16:creationId xmlns:a16="http://schemas.microsoft.com/office/drawing/2014/main" id="{C4B344DC-2ED5-306E-4A04-9B498EDC54C8}"/>
+              </a:ext>
+            </a:extLst>
+          </p:cNvPr>
+          <p:cNvPicPr>
+            <a:picLocks noChangeAspect="1"/>
+          </p:cNvPicPr>
+          <p:nvPr/>
+        </p:nvPicPr>
+        <p:blipFill>
+          <a:blip r:embed="rId2">
+            <a:extLst>
+              <a:ext uri="{28A0092B-C50C-407E-A947-70E740481C1C}">
+                <a14:useLocalDpi xmlns:a14="http://schemas.microsoft.com/office/drawing/2010/main" val="0"/>
+              </a:ext>
+            </a:extLst>
+          </a:blip>
+          <a:stretch>
+            <a:fillRect/>
+          </a:stretch>
+        </p:blipFill>
+        <p:spPr>
+          <a:xfrm>
+            <a:off x="816251" y="4024485"/>
+            <a:ext cx="2000250" cy="2000250"/>
+          </a:xfrm>
+          <a:prstGeom prst="rect">
+            <a:avLst/>
+          </a:prstGeom>
+        </p:spPr>
+      </p:pic>
+      <p:pic>
+        <p:nvPicPr>
+          <p:cNvPr id="9" name="Picture 8" descr="Qr code&#10;&#10;Description automatically generated">
+            <a:extLst>
+              <a:ext uri="{FF2B5EF4-FFF2-40B4-BE49-F238E27FC236}">
+                <a16:creationId xmlns:a16="http://schemas.microsoft.com/office/drawing/2014/main" id="{D7D01C6A-EFA8-A4AB-71B3-D37D26AA661E}"/>
+              </a:ext>
+            </a:extLst>
+          </p:cNvPr>
+          <p:cNvPicPr>
+            <a:picLocks noChangeAspect="1"/>
+          </p:cNvPicPr>
+          <p:nvPr/>
+        </p:nvPicPr>
+        <p:blipFill>
+          <a:blip r:embed="rId3">
+            <a:extLst>
+              <a:ext uri="{28A0092B-C50C-407E-A947-70E740481C1C}">
+                <a14:useLocalDpi xmlns:a14="http://schemas.microsoft.com/office/drawing/2010/main" val="0"/>
+              </a:ext>
+            </a:extLst>
+          </a:blip>
+          <a:stretch>
+            <a:fillRect/>
+          </a:stretch>
+        </p:blipFill>
+        <p:spPr>
+          <a:xfrm>
+            <a:off x="3053797" y="3547407"/>
+            <a:ext cx="2000250" cy="2000250"/>
+          </a:xfrm>
+          <a:prstGeom prst="rect">
+            <a:avLst/>
+          </a:prstGeom>
+        </p:spPr>
+      </p:pic>
+      <p:pic>
+        <p:nvPicPr>
+          <p:cNvPr id="11" name="Picture 10" descr="A picture containing clock, watch&#10;&#10;Description automatically generated">
+            <a:extLst>
+              <a:ext uri="{FF2B5EF4-FFF2-40B4-BE49-F238E27FC236}">
+                <a16:creationId xmlns:a16="http://schemas.microsoft.com/office/drawing/2014/main" id="{35DCA12C-431F-D07C-FE78-4EF15E28F524}"/>
+              </a:ext>
+            </a:extLst>
+          </p:cNvPr>
+          <p:cNvPicPr>
+            <a:picLocks noChangeAspect="1"/>
+          </p:cNvPicPr>
+          <p:nvPr/>
+        </p:nvPicPr>
+        <p:blipFill>
+          <a:blip r:embed="rId4">
+            <a:extLst>
+              <a:ext uri="{28A0092B-C50C-407E-A947-70E740481C1C}">
+                <a14:useLocalDpi xmlns:a14="http://schemas.microsoft.com/office/drawing/2010/main" val="0"/>
+              </a:ext>
+            </a:extLst>
+          </a:blip>
+          <a:stretch>
+            <a:fillRect/>
+          </a:stretch>
+        </p:blipFill>
+        <p:spPr>
+          <a:xfrm>
+            <a:off x="9316278" y="3010381"/>
+            <a:ext cx="2430114" cy="2430114"/>
+          </a:xfrm>
+          <a:prstGeom prst="rect">
+            <a:avLst/>
+          </a:prstGeom>
+        </p:spPr>
+      </p:pic>
+      <p:pic>
+        <p:nvPicPr>
+          <p:cNvPr id="13" name="Picture 12" descr="A picture containing clock, watch&#10;&#10;Description automatically generated">
+            <a:extLst>
+              <a:ext uri="{FF2B5EF4-FFF2-40B4-BE49-F238E27FC236}">
+                <a16:creationId xmlns:a16="http://schemas.microsoft.com/office/drawing/2014/main" id="{68DD875A-DC13-7C26-89AD-EA9527BB9C38}"/>
+              </a:ext>
+            </a:extLst>
+          </p:cNvPr>
+          <p:cNvPicPr>
+            <a:picLocks noChangeAspect="1"/>
+          </p:cNvPicPr>
+          <p:nvPr/>
+        </p:nvPicPr>
+        <p:blipFill>
+          <a:blip r:embed="rId5">
+            <a:extLst>
+              <a:ext uri="{28A0092B-C50C-407E-A947-70E740481C1C}">
+                <a14:useLocalDpi xmlns:a14="http://schemas.microsoft.com/office/drawing/2010/main" val="0"/>
+              </a:ext>
+            </a:extLst>
+          </a:blip>
+          <a:stretch>
+            <a:fillRect/>
+          </a:stretch>
+        </p:blipFill>
+        <p:spPr>
+          <a:xfrm>
+            <a:off x="6757396" y="3816797"/>
+            <a:ext cx="2430114" cy="2430114"/>
+          </a:xfrm>
+          <a:prstGeom prst="rect">
+            <a:avLst/>
+          </a:prstGeom>
+        </p:spPr>
+      </p:pic>
+      <p:sp>
+        <p:nvSpPr>
+          <p:cNvPr id="16" name="Oval 15">
+            <a:extLst>
+              <a:ext uri="{FF2B5EF4-FFF2-40B4-BE49-F238E27FC236}">
+                <a16:creationId xmlns:a16="http://schemas.microsoft.com/office/drawing/2014/main" id="{B145B1D1-FB6D-8F7C-D100-95E618096DEB}"/>
+              </a:ext>
+            </a:extLst>
+          </p:cNvPr>
+          <p:cNvSpPr/>
+          <p:nvPr/>
+        </p:nvSpPr>
+        <p:spPr>
+          <a:xfrm>
+            <a:off x="8453451" y="3707358"/>
+            <a:ext cx="862827" cy="892840"/>
+          </a:xfrm>
+          <a:prstGeom prst="ellipse">
+            <a:avLst/>
+          </a:prstGeom>
+          <a:noFill/>
+          <a:ln w="57150">
+            <a:solidFill>
+              <a:schemeClr val="tx1"/>
+            </a:solidFill>
+          </a:ln>
+        </p:spPr>
+        <p:style>
+          <a:lnRef idx="2">
+            <a:schemeClr val="accent1">
+              <a:shade val="50000"/>
+            </a:schemeClr>
+          </a:lnRef>
+          <a:fillRef idx="1">
+            <a:schemeClr val="accent1"/>
+          </a:fillRef>
+          <a:effectRef idx="0">
+            <a:schemeClr val="accent1"/>
+          </a:effectRef>
+          <a:fontRef idx="minor">
+            <a:schemeClr val="lt1"/>
+          </a:fontRef>
+        </p:style>
+        <p:txBody>
+          <a:bodyPr rtlCol="0" anchor="ctr"/>
+          <a:lstStyle/>
+          <a:p>
+            <a:pPr algn="ctr"/>
+            <a:endParaRPr lang="fr-CH"/>
+          </a:p>
+        </p:txBody>
+      </p:sp>
+      <p:sp>
+        <p:nvSpPr>
+          <p:cNvPr id="17" name="Oval 16">
+            <a:extLst>
+              <a:ext uri="{FF2B5EF4-FFF2-40B4-BE49-F238E27FC236}">
+                <a16:creationId xmlns:a16="http://schemas.microsoft.com/office/drawing/2014/main" id="{C4503AB7-B5A9-EFA6-F03F-28D54FF7DEBE}"/>
+              </a:ext>
+            </a:extLst>
+          </p:cNvPr>
+          <p:cNvSpPr/>
+          <p:nvPr/>
+        </p:nvSpPr>
+        <p:spPr>
+          <a:xfrm>
+            <a:off x="11012333" y="2874148"/>
+            <a:ext cx="862827" cy="892840"/>
+          </a:xfrm>
+          <a:prstGeom prst="ellipse">
+            <a:avLst/>
+          </a:prstGeom>
+          <a:noFill/>
+          <a:ln w="57150">
+            <a:solidFill>
+              <a:schemeClr val="tx1"/>
+            </a:solidFill>
+          </a:ln>
+        </p:spPr>
+        <p:style>
+          <a:lnRef idx="2">
+            <a:schemeClr val="accent1">
+              <a:shade val="50000"/>
+            </a:schemeClr>
+          </a:lnRef>
+          <a:fillRef idx="1">
+            <a:schemeClr val="accent1"/>
+          </a:fillRef>
+          <a:effectRef idx="0">
+            <a:schemeClr val="accent1"/>
+          </a:effectRef>
+          <a:fontRef idx="minor">
+            <a:schemeClr val="lt1"/>
+          </a:fontRef>
+        </p:style>
+        <p:txBody>
+          <a:bodyPr rtlCol="0" anchor="ctr"/>
+          <a:lstStyle/>
+          <a:p>
+            <a:pPr algn="ctr"/>
+            <a:endParaRPr lang="fr-CH"/>
+          </a:p>
+        </p:txBody>
+      </p:sp>
     </p:spTree>
     <p:extLst>
       <p:ext uri="{BB962C8B-B14F-4D97-AF65-F5344CB8AC3E}">
-        <p14:creationId xmlns:p14="http://schemas.microsoft.com/office/powerpoint/2010/main" val="3768015417"/>
+        <p14:creationId xmlns:p14="http://schemas.microsoft.com/office/powerpoint/2010/main" val="3945477269"/>
       </p:ext>
     </p:extLst>
   </p:cSld>
@@ -6229,7 +7395,7 @@
           <p:cNvPr id="2" name="Title 1">
             <a:extLst>
               <a:ext uri="{FF2B5EF4-FFF2-40B4-BE49-F238E27FC236}">
-                <a16:creationId xmlns:a16="http://schemas.microsoft.com/office/drawing/2014/main" id="{1C151A5B-1F30-7FD7-E874-09DDE452BA29}"/>
+                <a16:creationId xmlns:a16="http://schemas.microsoft.com/office/drawing/2014/main" id="{99F95439-6EBE-0118-1890-70FF73DA01DD}"/>
               </a:ext>
             </a:extLst>
           </p:cNvPr>
@@ -6246,20 +7412,24 @@
           <a:lstStyle/>
           <a:p>
             <a:r>
-              <a:rPr lang="fr-CH" dirty="0"/>
-              <a:t>Our </a:t>
-            </a:r>
-            <a:r>
-              <a:rPr lang="fr-CH" dirty="0" err="1"/>
-              <a:t>scheme</a:t>
-            </a:r>
-            <a:r>
-              <a:rPr lang="fr-CH" dirty="0"/>
-              <a:t> – Fourier </a:t>
-            </a:r>
-            <a:r>
-              <a:rPr lang="fr-CH" dirty="0" err="1"/>
-              <a:t>Hashing</a:t>
+              <a:rPr lang="fr-CH" dirty="0" err="1"/>
+              <a:t>Existing</a:t>
+            </a:r>
+            <a:r>
+              <a:rPr lang="fr-CH" dirty="0"/>
+              <a:t> </a:t>
+            </a:r>
+            <a:r>
+              <a:rPr lang="fr-CH" dirty="0" err="1"/>
+              <a:t>schemes</a:t>
+            </a:r>
+            <a:r>
+              <a:rPr lang="fr-CH" dirty="0"/>
+              <a:t> – PRNG-</a:t>
+            </a:r>
+            <a:r>
+              <a:rPr lang="fr-CH" dirty="0" err="1"/>
+              <a:t>based</a:t>
             </a:r>
             <a:endParaRPr lang="fr-CH" dirty="0"/>
           </a:p>
@@ -6270,7 +7440,7 @@
           <p:cNvPr id="3" name="Content Placeholder 2">
             <a:extLst>
               <a:ext uri="{FF2B5EF4-FFF2-40B4-BE49-F238E27FC236}">
-                <a16:creationId xmlns:a16="http://schemas.microsoft.com/office/drawing/2014/main" id="{D538BA7E-9B6E-042D-9A0E-8110601E4424}"/>
+                <a16:creationId xmlns:a16="http://schemas.microsoft.com/office/drawing/2014/main" id="{679F3403-5921-2567-441F-510EDE1E299B}"/>
               </a:ext>
             </a:extLst>
           </p:cNvPr>
@@ -6281,30 +7451,60 @@
             <p:ph idx="1"/>
           </p:nvPr>
         </p:nvSpPr>
-        <p:spPr/>
-        <p:txBody>
-          <a:bodyPr/>
-          <a:lstStyle/>
-          <a:p>
-            <a:r>
-              <a:rPr lang="fr-CH" dirty="0" err="1"/>
-              <a:t>Instead</a:t>
-            </a:r>
-            <a:r>
-              <a:rPr lang="fr-CH" dirty="0"/>
-              <a:t> of </a:t>
-            </a:r>
-            <a:r>
-              <a:rPr lang="fr-CH" dirty="0" err="1"/>
-              <a:t>generating</a:t>
-            </a:r>
-            <a:r>
-              <a:rPr lang="fr-CH" dirty="0"/>
-              <a:t> an image, </a:t>
-            </a:r>
-            <a:r>
-              <a:rPr lang="fr-CH" dirty="0" err="1"/>
-              <a:t>we</a:t>
+        <p:spPr>
+          <a:xfrm>
+            <a:off x="838200" y="1580606"/>
+            <a:ext cx="10515600" cy="4988245"/>
+          </a:xfrm>
+        </p:spPr>
+        <p:txBody>
+          <a:bodyPr/>
+          <a:lstStyle/>
+          <a:p>
+            <a:pPr marL="0" indent="0">
+              <a:buNone/>
+            </a:pPr>
+            <a:r>
+              <a:rPr lang="fr-CH" dirty="0" err="1"/>
+              <a:t>Idea</a:t>
+            </a:r>
+            <a:r>
+              <a:rPr lang="fr-CH" dirty="0"/>
+              <a:t> : </a:t>
+            </a:r>
+            <a:r>
+              <a:rPr lang="fr-CH" dirty="0" err="1"/>
+              <a:t>seed</a:t>
+            </a:r>
+            <a:r>
+              <a:rPr lang="fr-CH" dirty="0"/>
+              <a:t> a PRNG </a:t>
+            </a:r>
+            <a:r>
+              <a:rPr lang="fr-CH" dirty="0" err="1"/>
+              <a:t>with</a:t>
+            </a:r>
+            <a:r>
+              <a:rPr lang="fr-CH" dirty="0"/>
+              <a:t> the input hash and let </a:t>
+            </a:r>
+            <a:r>
+              <a:rPr lang="fr-CH" dirty="0" err="1"/>
+              <a:t>randomness</a:t>
+            </a:r>
+            <a:r>
+              <a:rPr lang="fr-CH" dirty="0"/>
+              <a:t> do the job</a:t>
+            </a:r>
+          </a:p>
+          <a:p>
+            <a:r>
+              <a:rPr lang="fr-CH" dirty="0"/>
+              <a:t>All the information </a:t>
+            </a:r>
+            <a:r>
+              <a:rPr lang="fr-CH" dirty="0" err="1"/>
+              <a:t>is</a:t>
             </a:r>
             <a:r>
               <a:rPr lang="fr-CH" dirty="0"/>
@@ -6312,57 +7512,29 @@
             </a:r>
             <a:r>
               <a:rPr lang="fr-CH" dirty="0" err="1"/>
-              <a:t>generate</a:t>
-            </a:r>
-            <a:r>
-              <a:rPr lang="fr-CH" dirty="0"/>
-              <a:t> a 2D Fourier </a:t>
-            </a:r>
-            <a:r>
-              <a:rPr lang="fr-CH" dirty="0" err="1"/>
-              <a:t>spectrum</a:t>
-            </a:r>
-            <a:r>
-              <a:rPr lang="fr-CH" dirty="0"/>
-              <a:t>.</a:t>
-            </a:r>
-          </a:p>
-          <a:p>
-            <a:r>
-              <a:rPr lang="fr-CH" dirty="0"/>
-              <a:t>To </a:t>
-            </a:r>
-            <a:r>
-              <a:rPr lang="fr-CH" dirty="0" err="1"/>
-              <a:t>get</a:t>
-            </a:r>
-            <a:r>
-              <a:rPr lang="fr-CH" dirty="0"/>
-              <a:t> </a:t>
-            </a:r>
-            <a:r>
-              <a:rPr lang="fr-CH" dirty="0" err="1"/>
-              <a:t>enough</a:t>
-            </a:r>
-            <a:r>
-              <a:rPr lang="fr-CH" dirty="0"/>
-              <a:t> information, </a:t>
-            </a:r>
-            <a:r>
-              <a:rPr lang="fr-CH" dirty="0" err="1"/>
-              <a:t>we</a:t>
-            </a:r>
-            <a:r>
-              <a:rPr lang="fr-CH" dirty="0"/>
-              <a:t> </a:t>
-            </a:r>
-            <a:r>
-              <a:rPr lang="fr-CH" dirty="0" err="1"/>
-              <a:t>repeat</a:t>
-            </a:r>
-            <a:r>
-              <a:rPr lang="fr-CH" dirty="0"/>
-              <a:t> the process 3 times.</a:t>
+              <a:t>used</a:t>
+            </a:r>
+            <a:endParaRPr lang="fr-CH" dirty="0"/>
+          </a:p>
+          <a:p>
+            <a:r>
+              <a:rPr lang="fr-CH" dirty="0" err="1"/>
+              <a:t>Offer</a:t>
+            </a:r>
+            <a:r>
+              <a:rPr lang="fr-CH" dirty="0"/>
+              <a:t> no </a:t>
+            </a:r>
+            <a:r>
+              <a:rPr lang="fr-CH" dirty="0" err="1"/>
+              <a:t>guarantee</a:t>
+            </a:r>
+            <a:endParaRPr lang="fr-CH" dirty="0"/>
+          </a:p>
+          <a:p>
+            <a:r>
+              <a:rPr lang="fr-CH" dirty="0"/>
+              <a:t>Must trust the PRNG</a:t>
             </a:r>
           </a:p>
         </p:txBody>
@@ -6372,7 +7544,7 @@
           <p:cNvPr id="4" name="Date Placeholder 3">
             <a:extLst>
               <a:ext uri="{FF2B5EF4-FFF2-40B4-BE49-F238E27FC236}">
-                <a16:creationId xmlns:a16="http://schemas.microsoft.com/office/drawing/2014/main" id="{B7C73F1A-A92E-ACEA-3299-79EE1E946FC0}"/>
+                <a16:creationId xmlns:a16="http://schemas.microsoft.com/office/drawing/2014/main" id="{1177A741-E67E-B834-ECD2-9FFE367A194E}"/>
               </a:ext>
             </a:extLst>
           </p:cNvPr>
@@ -6388,9 +7560,9 @@
           <a:bodyPr/>
           <a:lstStyle/>
           <a:p>
-            <a:fld id="{85377DBA-2290-4E4E-8906-76198A625EFE}" type="datetime1">
+            <a:fld id="{2C542BED-3802-4E63-841D-2D8A76B661A0}" type="datetime1">
               <a:rPr lang="fr-CH" smtClean="0"/>
-              <a:t>03.05.2022</a:t>
+              <a:t>06.05.2022</a:t>
             </a:fld>
             <a:endParaRPr lang="fr-CH"/>
           </a:p>
@@ -6401,7 +7573,7 @@
           <p:cNvPr id="5" name="Slide Number Placeholder 4">
             <a:extLst>
               <a:ext uri="{FF2B5EF4-FFF2-40B4-BE49-F238E27FC236}">
-                <a16:creationId xmlns:a16="http://schemas.microsoft.com/office/drawing/2014/main" id="{0188CCAF-1BBC-B66D-272E-FE2CD0E2726F}"/>
+                <a16:creationId xmlns:a16="http://schemas.microsoft.com/office/drawing/2014/main" id="{898625CE-5AED-2739-6C03-723EFC4ED252}"/>
               </a:ext>
             </a:extLst>
           </p:cNvPr>
@@ -6425,10 +7597,210 @@
           </a:p>
         </p:txBody>
       </p:sp>
+      <p:pic>
+        <p:nvPicPr>
+          <p:cNvPr id="9" name="Picture 8" descr="Background pattern&#10;&#10;Description automatically generated">
+            <a:extLst>
+              <a:ext uri="{FF2B5EF4-FFF2-40B4-BE49-F238E27FC236}">
+                <a16:creationId xmlns:a16="http://schemas.microsoft.com/office/drawing/2014/main" id="{BA39B7B6-486E-6675-BA36-C26521032BB3}"/>
+              </a:ext>
+            </a:extLst>
+          </p:cNvPr>
+          <p:cNvPicPr>
+            <a:picLocks noChangeAspect="1"/>
+          </p:cNvPicPr>
+          <p:nvPr/>
+        </p:nvPicPr>
+        <p:blipFill>
+          <a:blip r:embed="rId2">
+            <a:extLst>
+              <a:ext uri="{28A0092B-C50C-407E-A947-70E740481C1C}">
+                <a14:useLocalDpi xmlns:a14="http://schemas.microsoft.com/office/drawing/2010/main" val="0"/>
+              </a:ext>
+            </a:extLst>
+          </a:blip>
+          <a:stretch>
+            <a:fillRect/>
+          </a:stretch>
+        </p:blipFill>
+        <p:spPr>
+          <a:xfrm>
+            <a:off x="4870672" y="3527665"/>
+            <a:ext cx="1977664" cy="1977664"/>
+          </a:xfrm>
+          <a:prstGeom prst="rect">
+            <a:avLst/>
+          </a:prstGeom>
+        </p:spPr>
+      </p:pic>
+      <p:pic>
+        <p:nvPicPr>
+          <p:cNvPr id="11" name="Picture 10" descr="A picture containing background pattern&#10;&#10;Description automatically generated">
+            <a:extLst>
+              <a:ext uri="{FF2B5EF4-FFF2-40B4-BE49-F238E27FC236}">
+                <a16:creationId xmlns:a16="http://schemas.microsoft.com/office/drawing/2014/main" id="{C019FC9A-AF96-58B0-7E72-450007288AAC}"/>
+              </a:ext>
+            </a:extLst>
+          </p:cNvPr>
+          <p:cNvPicPr>
+            <a:picLocks noChangeAspect="1"/>
+          </p:cNvPicPr>
+          <p:nvPr/>
+        </p:nvPicPr>
+        <p:blipFill>
+          <a:blip r:embed="rId3">
+            <a:extLst>
+              <a:ext uri="{28A0092B-C50C-407E-A947-70E740481C1C}">
+                <a14:useLocalDpi xmlns:a14="http://schemas.microsoft.com/office/drawing/2010/main" val="0"/>
+              </a:ext>
+            </a:extLst>
+          </a:blip>
+          <a:stretch>
+            <a:fillRect/>
+          </a:stretch>
+        </p:blipFill>
+        <p:spPr>
+          <a:xfrm>
+            <a:off x="8554822" y="4750497"/>
+            <a:ext cx="1977664" cy="1977664"/>
+          </a:xfrm>
+          <a:prstGeom prst="rect">
+            <a:avLst/>
+          </a:prstGeom>
+        </p:spPr>
+      </p:pic>
+      <p:pic>
+        <p:nvPicPr>
+          <p:cNvPr id="13" name="Picture 12" descr="A close up of a person's face&#10;&#10;Description automatically generated with low confidence">
+            <a:extLst>
+              <a:ext uri="{FF2B5EF4-FFF2-40B4-BE49-F238E27FC236}">
+                <a16:creationId xmlns:a16="http://schemas.microsoft.com/office/drawing/2014/main" id="{3884A39A-1317-B01E-ECD9-3AB21D9DA34F}"/>
+              </a:ext>
+            </a:extLst>
+          </p:cNvPr>
+          <p:cNvPicPr>
+            <a:picLocks noChangeAspect="1"/>
+          </p:cNvPicPr>
+          <p:nvPr/>
+        </p:nvPicPr>
+        <p:blipFill>
+          <a:blip r:embed="rId4">
+            <a:extLst>
+              <a:ext uri="{28A0092B-C50C-407E-A947-70E740481C1C}">
+                <a14:useLocalDpi xmlns:a14="http://schemas.microsoft.com/office/drawing/2010/main" val="0"/>
+              </a:ext>
+            </a:extLst>
+          </a:blip>
+          <a:stretch>
+            <a:fillRect/>
+          </a:stretch>
+        </p:blipFill>
+        <p:spPr>
+          <a:xfrm>
+            <a:off x="8554822" y="2440168"/>
+            <a:ext cx="1977664" cy="1977664"/>
+          </a:xfrm>
+          <a:prstGeom prst="rect">
+            <a:avLst/>
+          </a:prstGeom>
+        </p:spPr>
+      </p:pic>
+      <p:sp>
+        <p:nvSpPr>
+          <p:cNvPr id="14" name="Arrow: Right 13">
+            <a:extLst>
+              <a:ext uri="{FF2B5EF4-FFF2-40B4-BE49-F238E27FC236}">
+                <a16:creationId xmlns:a16="http://schemas.microsoft.com/office/drawing/2014/main" id="{4FC388F5-B41A-0736-BE54-0A50DC14CAFF}"/>
+              </a:ext>
+            </a:extLst>
+          </p:cNvPr>
+          <p:cNvSpPr/>
+          <p:nvPr/>
+        </p:nvSpPr>
+        <p:spPr>
+          <a:xfrm rot="20055367">
+            <a:off x="7384479" y="3512595"/>
+            <a:ext cx="613954" cy="431074"/>
+          </a:xfrm>
+          <a:prstGeom prst="rightArrow">
+            <a:avLst/>
+          </a:prstGeom>
+        </p:spPr>
+        <p:style>
+          <a:lnRef idx="2">
+            <a:schemeClr val="accent1">
+              <a:shade val="50000"/>
+            </a:schemeClr>
+          </a:lnRef>
+          <a:fillRef idx="1">
+            <a:schemeClr val="accent1"/>
+          </a:fillRef>
+          <a:effectRef idx="0">
+            <a:schemeClr val="accent1"/>
+          </a:effectRef>
+          <a:fontRef idx="minor">
+            <a:schemeClr val="lt1"/>
+          </a:fontRef>
+        </p:style>
+        <p:txBody>
+          <a:bodyPr rtlCol="0" anchor="ctr"/>
+          <a:lstStyle/>
+          <a:p>
+            <a:pPr algn="ctr"/>
+            <a:endParaRPr lang="fr-CH"/>
+          </a:p>
+        </p:txBody>
+      </p:sp>
+      <p:sp>
+        <p:nvSpPr>
+          <p:cNvPr id="15" name="Arrow: Right 14">
+            <a:extLst>
+              <a:ext uri="{FF2B5EF4-FFF2-40B4-BE49-F238E27FC236}">
+                <a16:creationId xmlns:a16="http://schemas.microsoft.com/office/drawing/2014/main" id="{2C3FA19A-CE9F-7D3E-F58E-BEC6C609C927}"/>
+              </a:ext>
+            </a:extLst>
+          </p:cNvPr>
+          <p:cNvSpPr/>
+          <p:nvPr/>
+        </p:nvSpPr>
+        <p:spPr>
+          <a:xfrm rot="1594069">
+            <a:off x="7383643" y="5166713"/>
+            <a:ext cx="613954" cy="431074"/>
+          </a:xfrm>
+          <a:prstGeom prst="rightArrow">
+            <a:avLst/>
+          </a:prstGeom>
+        </p:spPr>
+        <p:style>
+          <a:lnRef idx="2">
+            <a:schemeClr val="accent1">
+              <a:shade val="50000"/>
+            </a:schemeClr>
+          </a:lnRef>
+          <a:fillRef idx="1">
+            <a:schemeClr val="accent1"/>
+          </a:fillRef>
+          <a:effectRef idx="0">
+            <a:schemeClr val="accent1"/>
+          </a:effectRef>
+          <a:fontRef idx="minor">
+            <a:schemeClr val="lt1"/>
+          </a:fontRef>
+        </p:style>
+        <p:txBody>
+          <a:bodyPr rtlCol="0" anchor="ctr"/>
+          <a:lstStyle/>
+          <a:p>
+            <a:pPr algn="ctr"/>
+            <a:endParaRPr lang="fr-CH"/>
+          </a:p>
+        </p:txBody>
+      </p:sp>
     </p:spTree>
     <p:extLst>
       <p:ext uri="{BB962C8B-B14F-4D97-AF65-F5344CB8AC3E}">
-        <p14:creationId xmlns:p14="http://schemas.microsoft.com/office/powerpoint/2010/main" val="2794819304"/>
+        <p14:creationId xmlns:p14="http://schemas.microsoft.com/office/powerpoint/2010/main" val="1427386466"/>
       </p:ext>
     </p:extLst>
   </p:cSld>
@@ -6460,7 +7832,7 @@
           <p:cNvPr id="2" name="Title 1">
             <a:extLst>
               <a:ext uri="{FF2B5EF4-FFF2-40B4-BE49-F238E27FC236}">
-                <a16:creationId xmlns:a16="http://schemas.microsoft.com/office/drawing/2014/main" id="{3F430262-9C1E-F357-013D-4A3F6E459938}"/>
+                <a16:creationId xmlns:a16="http://schemas.microsoft.com/office/drawing/2014/main" id="{33974009-B5C4-4D53-26B7-DEEF6B76C69E}"/>
               </a:ext>
             </a:extLst>
           </p:cNvPr>
@@ -6478,24 +7850,21 @@
           <a:p>
             <a:r>
               <a:rPr lang="fr-CH" dirty="0"/>
-              <a:t>Our </a:t>
-            </a:r>
-            <a:r>
-              <a:rPr lang="fr-CH" dirty="0" err="1"/>
-              <a:t>scheme</a:t>
-            </a:r>
-            <a:r>
-              <a:rPr lang="fr-CH" dirty="0"/>
-              <a:t> – Fourier </a:t>
-            </a:r>
-            <a:r>
-              <a:rPr lang="fr-CH" dirty="0" err="1"/>
-              <a:t>Hashing</a:t>
-            </a:r>
-            <a:r>
-              <a:rPr lang="fr-CH" dirty="0"/>
-              <a:t> 2</a:t>
-            </a:r>
+              <a:t>A </a:t>
+            </a:r>
+            <a:r>
+              <a:rPr lang="fr-CH" dirty="0" err="1"/>
+              <a:t>word</a:t>
+            </a:r>
+            <a:r>
+              <a:rPr lang="fr-CH" dirty="0"/>
+              <a:t> about Fourier </a:t>
+            </a:r>
+            <a:r>
+              <a:rPr lang="fr-CH" dirty="0" err="1"/>
+              <a:t>transforms</a:t>
+            </a:r>
+            <a:endParaRPr lang="fr-CH" dirty="0"/>
           </a:p>
         </p:txBody>
       </p:sp>
@@ -6504,7 +7873,7 @@
           <p:cNvPr id="3" name="Content Placeholder 2">
             <a:extLst>
               <a:ext uri="{FF2B5EF4-FFF2-40B4-BE49-F238E27FC236}">
-                <a16:creationId xmlns:a16="http://schemas.microsoft.com/office/drawing/2014/main" id="{F5C73729-33F8-5104-B78C-9BEFBBA1C5BE}"/>
+                <a16:creationId xmlns:a16="http://schemas.microsoft.com/office/drawing/2014/main" id="{1AA72E63-9118-25BB-8687-A5CD59F80067}"/>
               </a:ext>
             </a:extLst>
           </p:cNvPr>
@@ -6515,14 +7884,35 @@
             <p:ph idx="1"/>
           </p:nvPr>
         </p:nvSpPr>
-        <p:spPr/>
-        <p:txBody>
-          <a:bodyPr/>
-          <a:lstStyle/>
-          <a:p>
-            <a:r>
-              <a:rPr lang="fr-CH" dirty="0"/>
-              <a:t>Once the </a:t>
+        <p:spPr>
+          <a:xfrm>
+            <a:off x="838200" y="1690688"/>
+            <a:ext cx="10515600" cy="4351338"/>
+          </a:xfrm>
+        </p:spPr>
+        <p:txBody>
+          <a:bodyPr/>
+          <a:lstStyle/>
+          <a:p>
+            <a:r>
+              <a:rPr lang="fr-CH" dirty="0"/>
+              <a:t>Fourier </a:t>
+            </a:r>
+            <a:r>
+              <a:rPr lang="fr-CH" dirty="0" err="1"/>
+              <a:t>transform</a:t>
+            </a:r>
+            <a:r>
+              <a:rPr lang="fr-CH" dirty="0"/>
+              <a:t> </a:t>
+            </a:r>
+            <a:r>
+              <a:rPr lang="fr-CH" dirty="0" err="1"/>
+              <a:t>maps</a:t>
+            </a:r>
+            <a:r>
+              <a:rPr lang="fr-CH" dirty="0"/>
+              <a:t> </a:t>
             </a:r>
             <a:r>
               <a:rPr lang="fr-CH" dirty="0" err="1"/>
@@ -6530,19 +7920,27 @@
             </a:r>
             <a:r>
               <a:rPr lang="fr-CH" dirty="0"/>
-              <a:t> are </a:t>
-            </a:r>
-            <a:r>
-              <a:rPr lang="fr-CH" dirty="0" err="1"/>
-              <a:t>generated</a:t>
-            </a:r>
-            <a:r>
-              <a:rPr lang="fr-CH" dirty="0"/>
-              <a:t>, </a:t>
-            </a:r>
-            <a:r>
-              <a:rPr lang="fr-CH" dirty="0" err="1"/>
-              <a:t>we</a:t>
+              <a:t> to </a:t>
+            </a:r>
+            <a:r>
+              <a:rPr lang="fr-CH" dirty="0" err="1"/>
+              <a:t>frequences</a:t>
+            </a:r>
+            <a:r>
+              <a:rPr lang="fr-CH" dirty="0"/>
+              <a:t>, and </a:t>
+            </a:r>
+            <a:r>
+              <a:rPr lang="fr-CH" dirty="0" err="1"/>
+              <a:t>its</a:t>
+            </a:r>
+            <a:r>
+              <a:rPr lang="fr-CH" dirty="0"/>
+              <a:t> inverse </a:t>
+            </a:r>
+            <a:r>
+              <a:rPr lang="fr-CH" dirty="0" err="1"/>
+              <a:t>maps</a:t>
             </a:r>
             <a:r>
               <a:rPr lang="fr-CH" dirty="0"/>
@@ -6550,15 +7948,37 @@
             </a:r>
             <a:r>
               <a:rPr lang="fr-CH" dirty="0" err="1"/>
-              <a:t>sample</a:t>
-            </a:r>
-            <a:r>
-              <a:rPr lang="fr-CH" dirty="0"/>
-              <a:t> the </a:t>
-            </a:r>
-            <a:r>
-              <a:rPr lang="fr-CH" dirty="0" err="1"/>
-              <a:t>colors</a:t>
+              <a:t>frequences</a:t>
+            </a:r>
+            <a:r>
+              <a:rPr lang="fr-CH" dirty="0"/>
+              <a:t> back to a (unique) </a:t>
+            </a:r>
+            <a:r>
+              <a:rPr lang="fr-CH" dirty="0" err="1"/>
+              <a:t>function</a:t>
+            </a:r>
+            <a:r>
+              <a:rPr lang="fr-CH" dirty="0"/>
+              <a:t>.</a:t>
+            </a:r>
+          </a:p>
+          <a:p>
+            <a:r>
+              <a:rPr lang="fr-CH" dirty="0"/>
+              <a:t>A </a:t>
+            </a:r>
+            <a:r>
+              <a:rPr lang="fr-CH" dirty="0" err="1"/>
+              <a:t>picture</a:t>
+            </a:r>
+            <a:r>
+              <a:rPr lang="fr-CH" dirty="0"/>
+              <a:t> can </a:t>
+            </a:r>
+            <a:r>
+              <a:rPr lang="fr-CH" dirty="0" err="1"/>
+              <a:t>be</a:t>
             </a:r>
             <a:r>
               <a:rPr lang="fr-CH" dirty="0"/>
@@ -6566,7 +7986,29 @@
             </a:r>
             <a:r>
               <a:rPr lang="fr-CH" dirty="0" err="1"/>
-              <a:t>directly</a:t>
+              <a:t>considered</a:t>
+            </a:r>
+            <a:r>
+              <a:rPr lang="fr-CH" dirty="0"/>
+              <a:t> a 2D </a:t>
+            </a:r>
+            <a:r>
+              <a:rPr lang="fr-CH" dirty="0" err="1"/>
+              <a:t>function</a:t>
+            </a:r>
+            <a:r>
+              <a:rPr lang="fr-CH" dirty="0"/>
+              <a:t>.</a:t>
+            </a:r>
+          </a:p>
+          <a:p>
+            <a:r>
+              <a:rPr lang="fr-CH" dirty="0"/>
+              <a:t>Spectrum </a:t>
+            </a:r>
+            <a:r>
+              <a:rPr lang="fr-CH" dirty="0" err="1"/>
+              <a:t>concentrated</a:t>
             </a:r>
             <a:r>
               <a:rPr lang="fr-CH" dirty="0"/>
@@ -6574,12 +8016,41 @@
             </a:r>
             <a:r>
               <a:rPr lang="fr-CH" dirty="0" err="1"/>
-              <a:t>from</a:t>
-            </a:r>
-            <a:r>
-              <a:rPr lang="fr-CH" dirty="0"/>
-              <a:t> the hash.</a:t>
-            </a:r>
+              <a:t>around</a:t>
+            </a:r>
+            <a:r>
+              <a:rPr lang="fr-CH" dirty="0"/>
+              <a:t> the axes -&gt; </a:t>
+            </a:r>
+            <a:r>
+              <a:rPr lang="fr-CH" dirty="0" err="1"/>
+              <a:t>less</a:t>
+            </a:r>
+            <a:r>
+              <a:rPr lang="fr-CH" dirty="0"/>
+              <a:t> </a:t>
+            </a:r>
+            <a:r>
+              <a:rPr lang="fr-CH" dirty="0" err="1"/>
+              <a:t>noisy</a:t>
+            </a:r>
+            <a:r>
+              <a:rPr lang="fr-CH" dirty="0"/>
+              <a:t> images, </a:t>
+            </a:r>
+            <a:r>
+              <a:rPr lang="fr-CH" dirty="0" err="1"/>
+              <a:t>easier</a:t>
+            </a:r>
+            <a:r>
+              <a:rPr lang="fr-CH" dirty="0"/>
+              <a:t> to process for </a:t>
+            </a:r>
+            <a:r>
+              <a:rPr lang="fr-CH" dirty="0" err="1"/>
+              <a:t>humans</a:t>
+            </a:r>
+            <a:endParaRPr lang="fr-CH" dirty="0"/>
           </a:p>
         </p:txBody>
       </p:sp>
@@ -6588,7 +8059,7 @@
           <p:cNvPr id="4" name="Date Placeholder 3">
             <a:extLst>
               <a:ext uri="{FF2B5EF4-FFF2-40B4-BE49-F238E27FC236}">
-                <a16:creationId xmlns:a16="http://schemas.microsoft.com/office/drawing/2014/main" id="{4389FF5F-F4BA-3FC3-B5E1-A9F885AD8DB5}"/>
+                <a16:creationId xmlns:a16="http://schemas.microsoft.com/office/drawing/2014/main" id="{8F365A24-E7AF-7817-ED8B-7579556BEE7C}"/>
               </a:ext>
             </a:extLst>
           </p:cNvPr>
@@ -6604,9 +8075,9 @@
           <a:bodyPr/>
           <a:lstStyle/>
           <a:p>
-            <a:fld id="{03261FD3-B7B8-459E-A57A-2BC755413D80}" type="datetime1">
+            <a:fld id="{16BA1B30-54E2-487D-8FF5-99ED132E9819}" type="datetime1">
               <a:rPr lang="fr-CH" smtClean="0"/>
-              <a:t>03.05.2022</a:t>
+              <a:t>06.05.2022</a:t>
             </a:fld>
             <a:endParaRPr lang="fr-CH"/>
           </a:p>
@@ -6617,7 +8088,7 @@
           <p:cNvPr id="5" name="Slide Number Placeholder 4">
             <a:extLst>
               <a:ext uri="{FF2B5EF4-FFF2-40B4-BE49-F238E27FC236}">
-                <a16:creationId xmlns:a16="http://schemas.microsoft.com/office/drawing/2014/main" id="{39CE135F-D840-093F-031C-C50109572F35}"/>
+                <a16:creationId xmlns:a16="http://schemas.microsoft.com/office/drawing/2014/main" id="{42B40409-16D4-FD7E-69FA-84588152F1B4}"/>
               </a:ext>
             </a:extLst>
           </p:cNvPr>
@@ -6644,7 +8115,7 @@
     </p:spTree>
     <p:extLst>
       <p:ext uri="{BB962C8B-B14F-4D97-AF65-F5344CB8AC3E}">
-        <p14:creationId xmlns:p14="http://schemas.microsoft.com/office/powerpoint/2010/main" val="2032170742"/>
+        <p14:creationId xmlns:p14="http://schemas.microsoft.com/office/powerpoint/2010/main" val="3768015417"/>
       </p:ext>
     </p:extLst>
   </p:cSld>

</xml_diff>